<commit_message>
Updated data set for 2020 champions and salaries. Also, updated the presentation to reflect a STEM brief provided to the University of Arkansas on 220210.
</commit_message>
<xml_diff>
--- a/Base File - U of Ark.pptx
+++ b/Base File - U of Ark.pptx
@@ -5,30 +5,25 @@
     <p:sldMasterId id="2147483648" r:id="rId1"/>
   </p:sldMasterIdLst>
   <p:notesMasterIdLst>
-    <p:notesMasterId r:id="rId20"/>
+    <p:notesMasterId r:id="rId12"/>
   </p:notesMasterIdLst>
   <p:sldIdLst>
     <p:sldId id="266" r:id="rId2"/>
-    <p:sldId id="293" r:id="rId3"/>
-    <p:sldId id="258" r:id="rId4"/>
-    <p:sldId id="263" r:id="rId5"/>
-    <p:sldId id="421" r:id="rId6"/>
-    <p:sldId id="426" r:id="rId7"/>
-    <p:sldId id="422" r:id="rId8"/>
-    <p:sldId id="423" r:id="rId9"/>
-    <p:sldId id="424" r:id="rId10"/>
-    <p:sldId id="425" r:id="rId11"/>
-    <p:sldId id="427" r:id="rId12"/>
-    <p:sldId id="419" r:id="rId13"/>
-    <p:sldId id="259" r:id="rId14"/>
-    <p:sldId id="267" r:id="rId15"/>
-    <p:sldId id="268" r:id="rId16"/>
-    <p:sldId id="329" r:id="rId17"/>
-    <p:sldId id="428" r:id="rId18"/>
-    <p:sldId id="420" r:id="rId19"/>
+    <p:sldId id="419" r:id="rId3"/>
+    <p:sldId id="263" r:id="rId4"/>
+    <p:sldId id="421" r:id="rId5"/>
+    <p:sldId id="426" r:id="rId6"/>
+    <p:sldId id="422" r:id="rId7"/>
+    <p:sldId id="423" r:id="rId8"/>
+    <p:sldId id="424" r:id="rId9"/>
+    <p:sldId id="425" r:id="rId10"/>
+    <p:sldId id="427" r:id="rId11"/>
   </p:sldIdLst>
   <p:sldSz cx="9144000" cy="6858000" type="screen4x3"/>
   <p:notesSz cx="6858000" cy="9144000"/>
+  <p:custDataLst>
+    <p:tags r:id="rId13"/>
+  </p:custDataLst>
   <p:defaultTextStyle>
     <a:defPPr>
       <a:defRPr lang="en-US"/>
@@ -225,7 +220,7 @@
           <a:p>
             <a:fld id="{726F62DA-8226-40BB-A178-84CAFB4DB1C7}" type="datetimeFigureOut">
               <a:rPr lang="en-US" smtClean="0"/>
-              <a:t>11/12/2020</a:t>
+              <a:t>2/10/2022</a:t>
             </a:fld>
             <a:endParaRPr lang="en-US"/>
           </a:p>
@@ -490,93 +485,6 @@
     </a:lvl9pPr>
   </p:notesStyle>
 </p:notesMaster>
-</file>
-
-<file path=ppt/notesSlides/notesSlide1.xml><?xml version="1.0" encoding="utf-8"?>
-<p:notes xmlns:a="http://schemas.openxmlformats.org/drawingml/2006/main" xmlns:r="http://schemas.openxmlformats.org/officeDocument/2006/relationships" xmlns:p="http://schemas.openxmlformats.org/presentationml/2006/main">
-  <p:cSld>
-    <p:spTree>
-      <p:nvGrpSpPr>
-        <p:cNvPr id="1" name=""/>
-        <p:cNvGrpSpPr/>
-        <p:nvPr/>
-      </p:nvGrpSpPr>
-      <p:grpSpPr>
-        <a:xfrm>
-          <a:off x="0" y="0"/>
-          <a:ext cx="0" cy="0"/>
-          <a:chOff x="0" y="0"/>
-          <a:chExt cx="0" cy="0"/>
-        </a:xfrm>
-      </p:grpSpPr>
-      <p:sp>
-        <p:nvSpPr>
-          <p:cNvPr id="2" name="Slide Image Placeholder 1"/>
-          <p:cNvSpPr>
-            <a:spLocks noGrp="1" noRot="1" noChangeAspect="1"/>
-          </p:cNvSpPr>
-          <p:nvPr>
-            <p:ph type="sldImg"/>
-          </p:nvPr>
-        </p:nvSpPr>
-        <p:spPr/>
-      </p:sp>
-      <p:sp>
-        <p:nvSpPr>
-          <p:cNvPr id="3" name="Notes Placeholder 2"/>
-          <p:cNvSpPr>
-            <a:spLocks noGrp="1"/>
-          </p:cNvSpPr>
-          <p:nvPr>
-            <p:ph type="body" idx="1"/>
-          </p:nvPr>
-        </p:nvSpPr>
-        <p:spPr/>
-        <p:txBody>
-          <a:bodyPr/>
-          <a:lstStyle/>
-          <a:p>
-            <a:r>
-              <a:rPr lang="en-US" dirty="0"/>
-              <a:t>Slide </a:t>
-            </a:r>
-          </a:p>
-        </p:txBody>
-      </p:sp>
-      <p:sp>
-        <p:nvSpPr>
-          <p:cNvPr id="4" name="Slide Number Placeholder 3"/>
-          <p:cNvSpPr>
-            <a:spLocks noGrp="1"/>
-          </p:cNvSpPr>
-          <p:nvPr>
-            <p:ph type="sldNum" sz="quarter" idx="5"/>
-          </p:nvPr>
-        </p:nvSpPr>
-        <p:spPr/>
-        <p:txBody>
-          <a:bodyPr/>
-          <a:lstStyle/>
-          <a:p>
-            <a:fld id="{C47F8587-7F5F-F84F-A654-F93C7011A743}" type="slidenum">
-              <a:rPr lang="en-US" smtClean="0"/>
-              <a:t>2</a:t>
-            </a:fld>
-            <a:endParaRPr lang="en-US"/>
-          </a:p>
-        </p:txBody>
-      </p:sp>
-    </p:spTree>
-    <p:extLst>
-      <p:ext uri="{BB962C8B-B14F-4D97-AF65-F5344CB8AC3E}">
-        <p14:creationId xmlns:p14="http://schemas.microsoft.com/office/powerpoint/2010/main" val="2431098424"/>
-      </p:ext>
-    </p:extLst>
-  </p:cSld>
-  <p:clrMapOvr>
-    <a:masterClrMapping/>
-  </p:clrMapOvr>
-</p:notes>
 </file>
 
 <file path=ppt/slideLayouts/slideLayout1.xml><?xml version="1.0" encoding="utf-8"?>
@@ -3322,7 +3230,7 @@
         </p:spPr>
         <p:txBody>
           <a:bodyPr vert="horz" lIns="91440" tIns="45720" rIns="91440" bIns="45720" rtlCol="0" anchor="ctr">
-            <a:normAutofit fontScale="90000"/>
+            <a:normAutofit fontScale="97500"/>
           </a:bodyPr>
           <a:lstStyle>
             <a:lvl1pPr algn="ctr" defTabSz="914400" rtl="0" eaLnBrk="1" latinLnBrk="0" hangingPunct="1">
@@ -3342,18 +3250,11 @@
           </a:lstStyle>
           <a:p>
             <a:r>
-              <a:rPr lang="en-US" b="1" cap="small"/>
-              <a:t>Engineering and Operations Management </a:t>
+              <a:rPr lang="en-US" b="1" cap="small" dirty="0"/>
+              <a:t>Analytics is Fun!</a:t>
             </a:r>
             <a:br>
-              <a:rPr lang="en-US" b="1" cap="small"/>
-            </a:br>
-            <a:r>
-              <a:rPr lang="en-US" b="1" cap="small"/>
-              <a:t>Lunch &amp; Learn Webinar Series</a:t>
-            </a:r>
-            <a:br>
-              <a:rPr lang="en-US" b="1" cap="small"/>
+              <a:rPr lang="en-US" b="1" cap="small" dirty="0"/>
             </a:br>
             <a:endParaRPr lang="en-US" b="1" cap="small" dirty="0"/>
           </a:p>
@@ -3529,7 +3430,7 @@
             </a:pPr>
             <a:r>
               <a:rPr lang="en-US" dirty="0"/>
-              <a:t>November 11, 2020</a:t>
+              <a:t>February 10, 2022</a:t>
             </a:r>
           </a:p>
         </p:txBody>
@@ -3548,237 +3449,6 @@
 </file>
 
 <file path=ppt/slides/slide10.xml><?xml version="1.0" encoding="utf-8"?>
-<p:sld xmlns:a="http://schemas.openxmlformats.org/drawingml/2006/main" xmlns:r="http://schemas.openxmlformats.org/officeDocument/2006/relationships" xmlns:p="http://schemas.openxmlformats.org/presentationml/2006/main">
-  <p:cSld>
-    <p:spTree>
-      <p:nvGrpSpPr>
-        <p:cNvPr id="1" name=""/>
-        <p:cNvGrpSpPr/>
-        <p:nvPr/>
-      </p:nvGrpSpPr>
-      <p:grpSpPr>
-        <a:xfrm>
-          <a:off x="0" y="0"/>
-          <a:ext cx="0" cy="0"/>
-          <a:chOff x="0" y="0"/>
-          <a:chExt cx="0" cy="0"/>
-        </a:xfrm>
-      </p:grpSpPr>
-      <p:sp>
-        <p:nvSpPr>
-          <p:cNvPr id="2" name="Title 1">
-            <a:extLst>
-              <a:ext uri="{FF2B5EF4-FFF2-40B4-BE49-F238E27FC236}">
-                <a16:creationId xmlns:a16="http://schemas.microsoft.com/office/drawing/2014/main" id="{8FFB8084-FC73-46B2-B7FF-F38FA796504D}"/>
-              </a:ext>
-            </a:extLst>
-          </p:cNvPr>
-          <p:cNvSpPr>
-            <a:spLocks noGrp="1"/>
-          </p:cNvSpPr>
-          <p:nvPr>
-            <p:ph type="title"/>
-          </p:nvPr>
-        </p:nvSpPr>
-        <p:spPr/>
-        <p:txBody>
-          <a:bodyPr/>
-          <a:lstStyle/>
-          <a:p>
-            <a:r>
-              <a:rPr lang="en-US" dirty="0"/>
-              <a:t>Challenges</a:t>
-            </a:r>
-          </a:p>
-        </p:txBody>
-      </p:sp>
-      <p:sp>
-        <p:nvSpPr>
-          <p:cNvPr id="4" name="TextBox 3">
-            <a:extLst>
-              <a:ext uri="{FF2B5EF4-FFF2-40B4-BE49-F238E27FC236}">
-                <a16:creationId xmlns:a16="http://schemas.microsoft.com/office/drawing/2014/main" id="{05BE09D0-FA7C-4C1E-A624-E785F3E7D6D9}"/>
-              </a:ext>
-            </a:extLst>
-          </p:cNvPr>
-          <p:cNvSpPr txBox="1"/>
-          <p:nvPr/>
-        </p:nvSpPr>
-        <p:spPr>
-          <a:xfrm>
-            <a:off x="883930" y="1169408"/>
-            <a:ext cx="7533314" cy="6001643"/>
-          </a:xfrm>
-          <a:prstGeom prst="rect">
-            <a:avLst/>
-          </a:prstGeom>
-          <a:noFill/>
-        </p:spPr>
-        <p:txBody>
-          <a:bodyPr wrap="square" rtlCol="0">
-            <a:spAutoFit/>
-          </a:bodyPr>
-          <a:lstStyle/>
-          <a:p>
-            <a:pPr marL="285750" indent="-285750">
-              <a:buFont typeface="Arial" panose="020B0604020202020204" pitchFamily="34" charset="0"/>
-              <a:buChar char="•"/>
-            </a:pPr>
-            <a:r>
-              <a:rPr lang="en-US" sz="2400" dirty="0"/>
-              <a:t>Team analytics have changed. 2015 ESPN ranking only performed once.</a:t>
-            </a:r>
-          </a:p>
-          <a:p>
-            <a:pPr marL="285750" indent="-285750">
-              <a:buFont typeface="Arial" panose="020B0604020202020204" pitchFamily="34" charset="0"/>
-              <a:buChar char="•"/>
-            </a:pPr>
-            <a:r>
-              <a:rPr lang="en-US" sz="2400" dirty="0"/>
-              <a:t>Salary data issues</a:t>
-            </a:r>
-          </a:p>
-          <a:p>
-            <a:pPr marL="742950" lvl="1" indent="-285750">
-              <a:buFont typeface="Arial" panose="020B0604020202020204" pitchFamily="34" charset="0"/>
-              <a:buChar char="•"/>
-            </a:pPr>
-            <a:r>
-              <a:rPr lang="en-US" sz="2400" dirty="0"/>
-              <a:t>Use available cap space for NHL, NFL, NBA</a:t>
-            </a:r>
-          </a:p>
-          <a:p>
-            <a:pPr marL="742950" lvl="1" indent="-285750">
-              <a:buFont typeface="Arial" panose="020B0604020202020204" pitchFamily="34" charset="0"/>
-              <a:buChar char="•"/>
-            </a:pPr>
-            <a:r>
-              <a:rPr lang="en-US" sz="2400" dirty="0"/>
-              <a:t>Use total team salary for MLB</a:t>
-            </a:r>
-          </a:p>
-          <a:p>
-            <a:pPr marL="285750" indent="-285750">
-              <a:buFont typeface="Arial" panose="020B0604020202020204" pitchFamily="34" charset="0"/>
-              <a:buChar char="•"/>
-            </a:pPr>
-            <a:r>
-              <a:rPr lang="en-US" sz="2400" dirty="0"/>
-              <a:t>Expansion</a:t>
-            </a:r>
-          </a:p>
-          <a:p>
-            <a:pPr marL="742950" lvl="1" indent="-285750">
-              <a:buFont typeface="Arial" panose="020B0604020202020204" pitchFamily="34" charset="0"/>
-              <a:buChar char="•"/>
-            </a:pPr>
-            <a:r>
-              <a:rPr lang="en-US" sz="2400" dirty="0"/>
-              <a:t>Las Vegas Golden Knights</a:t>
-            </a:r>
-          </a:p>
-          <a:p>
-            <a:pPr marL="285750" indent="-285750">
-              <a:buFont typeface="Arial" panose="020B0604020202020204" pitchFamily="34" charset="0"/>
-              <a:buChar char="•"/>
-            </a:pPr>
-            <a:r>
-              <a:rPr lang="en-US" sz="2400" dirty="0"/>
-              <a:t>Moving</a:t>
-            </a:r>
-          </a:p>
-          <a:p>
-            <a:pPr marL="742950" lvl="1" indent="-285750">
-              <a:buFont typeface="Arial" panose="020B0604020202020204" pitchFamily="34" charset="0"/>
-              <a:buChar char="•"/>
-            </a:pPr>
-            <a:r>
-              <a:rPr lang="en-US" sz="2400" dirty="0"/>
-              <a:t>2016 Rams - St. Louis to Los Angeles</a:t>
-            </a:r>
-          </a:p>
-          <a:p>
-            <a:pPr marL="742950" lvl="1" indent="-285750">
-              <a:buFont typeface="Arial" panose="020B0604020202020204" pitchFamily="34" charset="0"/>
-              <a:buChar char="•"/>
-            </a:pPr>
-            <a:r>
-              <a:rPr lang="en-US" sz="2400" dirty="0"/>
-              <a:t>2017 Chargers - San Diego to Los Angeles</a:t>
-            </a:r>
-          </a:p>
-          <a:p>
-            <a:pPr marL="742950" lvl="1" indent="-285750">
-              <a:buFont typeface="Arial" panose="020B0604020202020204" pitchFamily="34" charset="0"/>
-              <a:buChar char="•"/>
-            </a:pPr>
-            <a:r>
-              <a:rPr lang="en-US" sz="2400" dirty="0"/>
-              <a:t>2020 Raiders - Oakland to Las Vegas</a:t>
-            </a:r>
-          </a:p>
-          <a:p>
-            <a:pPr marL="285750" indent="-285750">
-              <a:buFont typeface="Arial" panose="020B0604020202020204" pitchFamily="34" charset="0"/>
-              <a:buChar char="•"/>
-            </a:pPr>
-            <a:r>
-              <a:rPr lang="en-US" sz="2400" dirty="0"/>
-              <a:t>Name Change</a:t>
-            </a:r>
-          </a:p>
-          <a:p>
-            <a:pPr marL="742950" lvl="1" indent="-285750">
-              <a:buFont typeface="Arial" panose="020B0604020202020204" pitchFamily="34" charset="0"/>
-              <a:buChar char="•"/>
-            </a:pPr>
-            <a:r>
-              <a:rPr lang="en-US" sz="2400" dirty="0"/>
-              <a:t>Washington Football Team</a:t>
-            </a:r>
-          </a:p>
-          <a:p>
-            <a:pPr marL="285750" indent="-285750">
-              <a:buFont typeface="Arial" panose="020B0604020202020204" pitchFamily="34" charset="0"/>
-              <a:buChar char="•"/>
-            </a:pPr>
-            <a:r>
-              <a:rPr lang="en-US" sz="2400" dirty="0"/>
-              <a:t>2020 US Census</a:t>
-            </a:r>
-          </a:p>
-          <a:p>
-            <a:pPr marL="742950" lvl="1" indent="-285750">
-              <a:buFont typeface="Arial" panose="020B0604020202020204" pitchFamily="34" charset="0"/>
-              <a:buChar char="•"/>
-            </a:pPr>
-            <a:endParaRPr lang="en-US" sz="2400" dirty="0"/>
-          </a:p>
-          <a:p>
-            <a:pPr marL="285750" indent="-285750">
-              <a:buFont typeface="Arial" panose="020B0604020202020204" pitchFamily="34" charset="0"/>
-              <a:buChar char="•"/>
-            </a:pPr>
-            <a:endParaRPr lang="en-US" sz="2400" dirty="0"/>
-          </a:p>
-        </p:txBody>
-      </p:sp>
-    </p:spTree>
-    <p:extLst>
-      <p:ext uri="{BB962C8B-B14F-4D97-AF65-F5344CB8AC3E}">
-        <p14:creationId xmlns:p14="http://schemas.microsoft.com/office/powerpoint/2010/main" val="3725537746"/>
-      </p:ext>
-    </p:extLst>
-  </p:cSld>
-  <p:clrMapOvr>
-    <a:masterClrMapping/>
-  </p:clrMapOvr>
-</p:sld>
-</file>
-
-<file path=ppt/slides/slide11.xml><?xml version="1.0" encoding="utf-8"?>
 <p:sld xmlns:a="http://schemas.openxmlformats.org/drawingml/2006/main" xmlns:r="http://schemas.openxmlformats.org/officeDocument/2006/relationships" xmlns:p="http://schemas.openxmlformats.org/presentationml/2006/main">
   <p:cSld>
     <p:spTree>
@@ -3882,7 +3552,7 @@
 </p:sld>
 </file>
 
-<file path=ppt/slides/slide12.xml><?xml version="1.0" encoding="utf-8"?>
+<file path=ppt/slides/slide2.xml><?xml version="1.0" encoding="utf-8"?>
 <p:sld xmlns:a="http://schemas.openxmlformats.org/drawingml/2006/main" xmlns:r="http://schemas.openxmlformats.org/officeDocument/2006/relationships" xmlns:p="http://schemas.openxmlformats.org/presentationml/2006/main">
   <p:cSld>
     <p:spTree>
@@ -4037,1647 +3707,10 @@
           </a:prstGeom>
         </p:spPr>
       </p:pic>
-      <p:pic>
-        <p:nvPicPr>
-          <p:cNvPr id="21" name="Picture 20">
-            <a:extLst>
-              <a:ext uri="{FF2B5EF4-FFF2-40B4-BE49-F238E27FC236}">
-                <a16:creationId xmlns:a16="http://schemas.microsoft.com/office/drawing/2014/main" id="{6BCE5B58-8603-E841-B6A3-3EE1D7AC5DCA}"/>
-              </a:ext>
-            </a:extLst>
-          </p:cNvPr>
-          <p:cNvPicPr>
-            <a:picLocks noChangeAspect="1"/>
-          </p:cNvPicPr>
-          <p:nvPr/>
-        </p:nvPicPr>
-        <p:blipFill rotWithShape="1">
-          <a:blip r:embed="rId4">
-            <a:extLst>
-              <a:ext uri="{28A0092B-C50C-407E-A947-70E740481C1C}">
-                <a14:useLocalDpi xmlns:a14="http://schemas.microsoft.com/office/drawing/2010/main" val="0"/>
-              </a:ext>
-            </a:extLst>
-          </a:blip>
-          <a:srcRect t="7058"/>
-          <a:stretch/>
-        </p:blipFill>
-        <p:spPr>
-          <a:xfrm>
-            <a:off x="4572000" y="5073917"/>
-            <a:ext cx="3911600" cy="602726"/>
-          </a:xfrm>
-          <a:prstGeom prst="rect">
-            <a:avLst/>
-          </a:prstGeom>
-        </p:spPr>
-      </p:pic>
-      <p:sp>
-        <p:nvSpPr>
-          <p:cNvPr id="22" name="Oval 21">
-            <a:extLst>
-              <a:ext uri="{FF2B5EF4-FFF2-40B4-BE49-F238E27FC236}">
-                <a16:creationId xmlns:a16="http://schemas.microsoft.com/office/drawing/2014/main" id="{B9D0887D-5843-4947-8F1D-8548A545824C}"/>
-              </a:ext>
-            </a:extLst>
-          </p:cNvPr>
-          <p:cNvSpPr/>
-          <p:nvPr/>
-        </p:nvSpPr>
-        <p:spPr>
-          <a:xfrm>
-            <a:off x="4546600" y="4997588"/>
-            <a:ext cx="838200" cy="742555"/>
-          </a:xfrm>
-          <a:prstGeom prst="ellipse">
-            <a:avLst/>
-          </a:prstGeom>
-          <a:noFill/>
-          <a:ln>
-            <a:solidFill>
-              <a:schemeClr val="bg2">
-                <a:lumMod val="75000"/>
-              </a:schemeClr>
-            </a:solidFill>
-          </a:ln>
-        </p:spPr>
-        <p:style>
-          <a:lnRef idx="2">
-            <a:schemeClr val="accent1">
-              <a:shade val="50000"/>
-            </a:schemeClr>
-          </a:lnRef>
-          <a:fillRef idx="1">
-            <a:schemeClr val="accent1"/>
-          </a:fillRef>
-          <a:effectRef idx="0">
-            <a:schemeClr val="accent1"/>
-          </a:effectRef>
-          <a:fontRef idx="minor">
-            <a:schemeClr val="lt1"/>
-          </a:fontRef>
-        </p:style>
-        <p:txBody>
-          <a:bodyPr rtlCol="0" anchor="ctr"/>
-          <a:lstStyle/>
-          <a:p>
-            <a:pPr algn="ctr"/>
-            <a:endParaRPr lang="en-US"/>
-          </a:p>
-        </p:txBody>
-      </p:sp>
     </p:spTree>
     <p:extLst>
       <p:ext uri="{BB962C8B-B14F-4D97-AF65-F5344CB8AC3E}">
-        <p14:creationId xmlns:p14="http://schemas.microsoft.com/office/powerpoint/2010/main" val="2615816631"/>
-      </p:ext>
-    </p:extLst>
-  </p:cSld>
-  <p:clrMapOvr>
-    <a:masterClrMapping/>
-  </p:clrMapOvr>
-</p:sld>
-</file>
-
-<file path=ppt/slides/slide13.xml><?xml version="1.0" encoding="utf-8"?>
-<p:sld xmlns:a="http://schemas.openxmlformats.org/drawingml/2006/main" xmlns:r="http://schemas.openxmlformats.org/officeDocument/2006/relationships" xmlns:p="http://schemas.openxmlformats.org/presentationml/2006/main">
-  <p:cSld>
-    <p:spTree>
-      <p:nvGrpSpPr>
-        <p:cNvPr id="1" name=""/>
-        <p:cNvGrpSpPr/>
-        <p:nvPr/>
-      </p:nvGrpSpPr>
-      <p:grpSpPr>
-        <a:xfrm>
-          <a:off x="0" y="0"/>
-          <a:ext cx="0" cy="0"/>
-          <a:chOff x="0" y="0"/>
-          <a:chExt cx="0" cy="0"/>
-        </a:xfrm>
-      </p:grpSpPr>
-      <p:sp>
-        <p:nvSpPr>
-          <p:cNvPr id="2" name="Title 1"/>
-          <p:cNvSpPr>
-            <a:spLocks noGrp="1"/>
-          </p:cNvSpPr>
-          <p:nvPr>
-            <p:ph type="title"/>
-          </p:nvPr>
-        </p:nvSpPr>
-        <p:spPr/>
-        <p:txBody>
-          <a:bodyPr>
-            <a:normAutofit fontScale="90000"/>
-          </a:bodyPr>
-          <a:lstStyle/>
-          <a:p>
-            <a:r>
-              <a:rPr lang="en-US" cap="small" dirty="0"/>
-              <a:t>M.S. Operations Management </a:t>
-            </a:r>
-            <a:br>
-              <a:rPr lang="en-US" cap="small" dirty="0"/>
-            </a:br>
-            <a:r>
-              <a:rPr lang="en-US" cap="small" dirty="0"/>
-              <a:t>at a glance:</a:t>
-            </a:r>
-          </a:p>
-        </p:txBody>
-      </p:sp>
-      <p:sp>
-        <p:nvSpPr>
-          <p:cNvPr id="3" name="Content Placeholder 2"/>
-          <p:cNvSpPr>
-            <a:spLocks noGrp="1"/>
-          </p:cNvSpPr>
-          <p:nvPr>
-            <p:ph idx="1"/>
-          </p:nvPr>
-        </p:nvSpPr>
-        <p:spPr/>
-        <p:txBody>
-          <a:bodyPr>
-            <a:normAutofit fontScale="92500" lnSpcReduction="20000"/>
-          </a:bodyPr>
-          <a:lstStyle/>
-          <a:p>
-            <a:r>
-              <a:rPr lang="en-US" dirty="0"/>
-              <a:t>100% Online (or live)</a:t>
-            </a:r>
-          </a:p>
-          <a:p>
-            <a:r>
-              <a:rPr lang="en-US" dirty="0"/>
-              <a:t>In-State Tuition for Everyone!</a:t>
-            </a:r>
-          </a:p>
-          <a:p>
-            <a:r>
-              <a:rPr lang="en-US" dirty="0"/>
-              <a:t>10 Graduate Course Program (30 hours)</a:t>
-            </a:r>
-          </a:p>
-          <a:p>
-            <a:pPr lvl="1"/>
-            <a:r>
-              <a:rPr lang="en-US" dirty="0"/>
-              <a:t>Up to 4 prerequisite classes may be required</a:t>
-            </a:r>
-          </a:p>
-          <a:p>
-            <a:r>
-              <a:rPr lang="en-US" dirty="0"/>
-              <a:t>Five 8-week Sessions Per Year</a:t>
-            </a:r>
-          </a:p>
-          <a:p>
-            <a:r>
-              <a:rPr lang="en-US" dirty="0"/>
-              <a:t>Pair Master’s with Graduate Certificate with </a:t>
-            </a:r>
-            <a:br>
-              <a:rPr lang="en-US" dirty="0"/>
-            </a:br>
-            <a:r>
-              <a:rPr lang="en-US" dirty="0"/>
-              <a:t>no extra hours required</a:t>
-            </a:r>
-          </a:p>
-          <a:p>
-            <a:r>
-              <a:rPr lang="en-US" dirty="0"/>
-              <a:t>No GRE/GMAT required with 3.0 Bachelor's GPA</a:t>
-            </a:r>
-          </a:p>
-          <a:p>
-            <a:r>
-              <a:rPr lang="en-US" dirty="0"/>
-              <a:t>Total Program Cost is $12,000 to $15,000 (depending on </a:t>
-            </a:r>
-            <a:r>
-              <a:rPr lang="en-US" dirty="0" err="1"/>
-              <a:t>prereqs</a:t>
-            </a:r>
-            <a:r>
-              <a:rPr lang="en-US" dirty="0"/>
-              <a:t> needed)</a:t>
-            </a:r>
-          </a:p>
-          <a:p>
-            <a:endParaRPr lang="en-US" dirty="0"/>
-          </a:p>
-        </p:txBody>
-      </p:sp>
-    </p:spTree>
-    <p:extLst>
-      <p:ext uri="{BB962C8B-B14F-4D97-AF65-F5344CB8AC3E}">
-        <p14:creationId xmlns:p14="http://schemas.microsoft.com/office/powerpoint/2010/main" val="1263422216"/>
-      </p:ext>
-    </p:extLst>
-  </p:cSld>
-  <p:clrMapOvr>
-    <a:masterClrMapping/>
-  </p:clrMapOvr>
-</p:sld>
-</file>
-
-<file path=ppt/slides/slide14.xml><?xml version="1.0" encoding="utf-8"?>
-<p:sld xmlns:a="http://schemas.openxmlformats.org/drawingml/2006/main" xmlns:r="http://schemas.openxmlformats.org/officeDocument/2006/relationships" xmlns:p="http://schemas.openxmlformats.org/presentationml/2006/main">
-  <p:cSld>
-    <p:spTree>
-      <p:nvGrpSpPr>
-        <p:cNvPr id="1" name=""/>
-        <p:cNvGrpSpPr/>
-        <p:nvPr/>
-      </p:nvGrpSpPr>
-      <p:grpSpPr>
-        <a:xfrm>
-          <a:off x="0" y="0"/>
-          <a:ext cx="0" cy="0"/>
-          <a:chOff x="0" y="0"/>
-          <a:chExt cx="0" cy="0"/>
-        </a:xfrm>
-      </p:grpSpPr>
-      <p:sp>
-        <p:nvSpPr>
-          <p:cNvPr id="3" name="Title 2">
-            <a:extLst>
-              <a:ext uri="{FF2B5EF4-FFF2-40B4-BE49-F238E27FC236}">
-                <a16:creationId xmlns:a16="http://schemas.microsoft.com/office/drawing/2014/main" id="{C30ECDC0-2E8C-D34D-983C-2CE74E6E5E77}"/>
-              </a:ext>
-            </a:extLst>
-          </p:cNvPr>
-          <p:cNvSpPr>
-            <a:spLocks noGrp="1"/>
-          </p:cNvSpPr>
-          <p:nvPr>
-            <p:ph type="title"/>
-          </p:nvPr>
-        </p:nvSpPr>
-        <p:spPr/>
-        <p:txBody>
-          <a:bodyPr>
-            <a:normAutofit/>
-          </a:bodyPr>
-          <a:lstStyle/>
-          <a:p>
-            <a:r>
-              <a:rPr lang="en-US" sz="3600" dirty="0"/>
-              <a:t>Graduate Certificates</a:t>
-            </a:r>
-          </a:p>
-        </p:txBody>
-      </p:sp>
-      <p:pic>
-        <p:nvPicPr>
-          <p:cNvPr id="4" name="Picture 3">
-            <a:extLst>
-              <a:ext uri="{FF2B5EF4-FFF2-40B4-BE49-F238E27FC236}">
-                <a16:creationId xmlns:a16="http://schemas.microsoft.com/office/drawing/2014/main" id="{ECA982D1-7913-0744-8984-30927B847FDD}"/>
-              </a:ext>
-            </a:extLst>
-          </p:cNvPr>
-          <p:cNvPicPr>
-            <a:picLocks noChangeAspect="1"/>
-          </p:cNvPicPr>
-          <p:nvPr/>
-        </p:nvPicPr>
-        <p:blipFill>
-          <a:blip r:embed="rId2" cstate="email">
-            <a:extLst>
-              <a:ext uri="{28A0092B-C50C-407E-A947-70E740481C1C}">
-                <a14:useLocalDpi xmlns:a14="http://schemas.microsoft.com/office/drawing/2010/main" val="0"/>
-              </a:ext>
-            </a:extLst>
-          </a:blip>
-          <a:stretch>
-            <a:fillRect/>
-          </a:stretch>
-        </p:blipFill>
-        <p:spPr>
-          <a:xfrm>
-            <a:off x="457200" y="2239960"/>
-            <a:ext cx="2330970" cy="776990"/>
-          </a:xfrm>
-          <a:prstGeom prst="rect">
-            <a:avLst/>
-          </a:prstGeom>
-          <a:ln w="38100" cap="sq">
-            <a:solidFill>
-              <a:srgbClr val="000000"/>
-            </a:solidFill>
-            <a:prstDash val="solid"/>
-            <a:miter lim="800000"/>
-          </a:ln>
-          <a:effectLst>
-            <a:outerShdw blurRad="50800" dist="38100" dir="2700000" algn="tl" rotWithShape="0">
-              <a:srgbClr val="000000">
-                <a:alpha val="43000"/>
-              </a:srgbClr>
-            </a:outerShdw>
-          </a:effectLst>
-        </p:spPr>
-      </p:pic>
-      <p:pic>
-        <p:nvPicPr>
-          <p:cNvPr id="5" name="Picture 4">
-            <a:extLst>
-              <a:ext uri="{FF2B5EF4-FFF2-40B4-BE49-F238E27FC236}">
-                <a16:creationId xmlns:a16="http://schemas.microsoft.com/office/drawing/2014/main" id="{BDFAFA4D-5912-974A-ABB6-F8C83CBFF310}"/>
-              </a:ext>
-            </a:extLst>
-          </p:cNvPr>
-          <p:cNvPicPr>
-            <a:picLocks noChangeAspect="1"/>
-          </p:cNvPicPr>
-          <p:nvPr/>
-        </p:nvPicPr>
-        <p:blipFill>
-          <a:blip r:embed="rId3" cstate="email">
-            <a:extLst>
-              <a:ext uri="{28A0092B-C50C-407E-A947-70E740481C1C}">
-                <a14:useLocalDpi xmlns:a14="http://schemas.microsoft.com/office/drawing/2010/main" val="0"/>
-              </a:ext>
-            </a:extLst>
-          </a:blip>
-          <a:stretch>
-            <a:fillRect/>
-          </a:stretch>
-        </p:blipFill>
-        <p:spPr>
-          <a:xfrm>
-            <a:off x="457200" y="3256458"/>
-            <a:ext cx="2329790" cy="776597"/>
-          </a:xfrm>
-          <a:prstGeom prst="rect">
-            <a:avLst/>
-          </a:prstGeom>
-          <a:ln w="38100" cap="sq">
-            <a:solidFill>
-              <a:srgbClr val="000000"/>
-            </a:solidFill>
-            <a:prstDash val="solid"/>
-            <a:miter lim="800000"/>
-          </a:ln>
-          <a:effectLst>
-            <a:outerShdw blurRad="50800" dist="38100" dir="2700000" algn="tl" rotWithShape="0">
-              <a:srgbClr val="000000">
-                <a:alpha val="43000"/>
-              </a:srgbClr>
-            </a:outerShdw>
-          </a:effectLst>
-        </p:spPr>
-      </p:pic>
-      <p:pic>
-        <p:nvPicPr>
-          <p:cNvPr id="6" name="Picture 5">
-            <a:extLst>
-              <a:ext uri="{FF2B5EF4-FFF2-40B4-BE49-F238E27FC236}">
-                <a16:creationId xmlns:a16="http://schemas.microsoft.com/office/drawing/2014/main" id="{BB2CA383-074B-5840-A6CB-FAC63616BF22}"/>
-              </a:ext>
-            </a:extLst>
-          </p:cNvPr>
-          <p:cNvPicPr>
-            <a:picLocks noChangeAspect="1"/>
-          </p:cNvPicPr>
-          <p:nvPr/>
-        </p:nvPicPr>
-        <p:blipFill>
-          <a:blip r:embed="rId4" cstate="email">
-            <a:extLst>
-              <a:ext uri="{28A0092B-C50C-407E-A947-70E740481C1C}">
-                <a14:useLocalDpi xmlns:a14="http://schemas.microsoft.com/office/drawing/2010/main" val="0"/>
-              </a:ext>
-            </a:extLst>
-          </a:blip>
-          <a:stretch>
-            <a:fillRect/>
-          </a:stretch>
-        </p:blipFill>
-        <p:spPr>
-          <a:xfrm>
-            <a:off x="457200" y="4272561"/>
-            <a:ext cx="2330970" cy="776990"/>
-          </a:xfrm>
-          <a:prstGeom prst="rect">
-            <a:avLst/>
-          </a:prstGeom>
-          <a:ln w="38100" cap="sq">
-            <a:solidFill>
-              <a:srgbClr val="000000"/>
-            </a:solidFill>
-            <a:prstDash val="solid"/>
-            <a:miter lim="800000"/>
-          </a:ln>
-          <a:effectLst>
-            <a:outerShdw blurRad="50800" dist="38100" dir="2700000" algn="tl" rotWithShape="0">
-              <a:srgbClr val="000000">
-                <a:alpha val="43000"/>
-              </a:srgbClr>
-            </a:outerShdw>
-          </a:effectLst>
-        </p:spPr>
-      </p:pic>
-      <p:sp>
-        <p:nvSpPr>
-          <p:cNvPr id="2" name="TextBox 1">
-            <a:extLst>
-              <a:ext uri="{FF2B5EF4-FFF2-40B4-BE49-F238E27FC236}">
-                <a16:creationId xmlns:a16="http://schemas.microsoft.com/office/drawing/2014/main" id="{7D6CC0DF-6CA3-4045-8D60-C44F1A5284D4}"/>
-              </a:ext>
-            </a:extLst>
-          </p:cNvPr>
-          <p:cNvSpPr txBox="1"/>
-          <p:nvPr/>
-        </p:nvSpPr>
-        <p:spPr>
-          <a:xfrm>
-            <a:off x="3052722" y="2165883"/>
-            <a:ext cx="5231567" cy="923330"/>
-          </a:xfrm>
-          <a:prstGeom prst="rect">
-            <a:avLst/>
-          </a:prstGeom>
-          <a:noFill/>
-        </p:spPr>
-        <p:txBody>
-          <a:bodyPr wrap="square" rtlCol="0">
-            <a:spAutoFit/>
-          </a:bodyPr>
-          <a:lstStyle/>
-          <a:p>
-            <a:r>
-              <a:rPr lang="en-US" u="sng" dirty="0"/>
-              <a:t>Project Management</a:t>
-            </a:r>
-            <a:r>
-              <a:rPr lang="en-US" dirty="0"/>
-              <a:t> – Designed to provide skills to become better project managers and prepare for PMP Certification </a:t>
-            </a:r>
-          </a:p>
-        </p:txBody>
-      </p:sp>
-      <p:sp>
-        <p:nvSpPr>
-          <p:cNvPr id="10" name="TextBox 9">
-            <a:extLst>
-              <a:ext uri="{FF2B5EF4-FFF2-40B4-BE49-F238E27FC236}">
-                <a16:creationId xmlns:a16="http://schemas.microsoft.com/office/drawing/2014/main" id="{5F0E904A-9824-494F-97B6-C47B4C3BA67D}"/>
-              </a:ext>
-            </a:extLst>
-          </p:cNvPr>
-          <p:cNvSpPr txBox="1"/>
-          <p:nvPr/>
-        </p:nvSpPr>
-        <p:spPr>
-          <a:xfrm>
-            <a:off x="3052720" y="4337891"/>
-            <a:ext cx="5231567" cy="646331"/>
-          </a:xfrm>
-          <a:prstGeom prst="rect">
-            <a:avLst/>
-          </a:prstGeom>
-          <a:noFill/>
-        </p:spPr>
-        <p:txBody>
-          <a:bodyPr wrap="square" rtlCol="0">
-            <a:spAutoFit/>
-          </a:bodyPr>
-          <a:lstStyle/>
-          <a:p>
-            <a:r>
-              <a:rPr lang="en-US" u="sng" dirty="0"/>
-              <a:t>Homeland Security</a:t>
-            </a:r>
-            <a:r>
-              <a:rPr lang="en-US" dirty="0"/>
-              <a:t> – Designed for industry and safety professionals to learn how to mitigate risk</a:t>
-            </a:r>
-          </a:p>
-        </p:txBody>
-      </p:sp>
-      <p:sp>
-        <p:nvSpPr>
-          <p:cNvPr id="11" name="TextBox 10">
-            <a:extLst>
-              <a:ext uri="{FF2B5EF4-FFF2-40B4-BE49-F238E27FC236}">
-                <a16:creationId xmlns:a16="http://schemas.microsoft.com/office/drawing/2014/main" id="{B5EFA1FD-CE7C-A749-9646-6E710D266CB7}"/>
-              </a:ext>
-            </a:extLst>
-          </p:cNvPr>
-          <p:cNvSpPr txBox="1"/>
-          <p:nvPr/>
-        </p:nvSpPr>
-        <p:spPr>
-          <a:xfrm>
-            <a:off x="3052720" y="3183090"/>
-            <a:ext cx="5231567" cy="923330"/>
-          </a:xfrm>
-          <a:prstGeom prst="rect">
-            <a:avLst/>
-          </a:prstGeom>
-          <a:noFill/>
-        </p:spPr>
-        <p:txBody>
-          <a:bodyPr wrap="square" rtlCol="0">
-            <a:spAutoFit/>
-          </a:bodyPr>
-          <a:lstStyle/>
-          <a:p>
-            <a:r>
-              <a:rPr lang="en-US" u="sng" dirty="0"/>
-              <a:t>Lean Six Sigma</a:t>
-            </a:r>
-            <a:r>
-              <a:rPr lang="en-US" dirty="0"/>
-              <a:t> – Learn how to eliminate problems, remove waste and reduce variation to improve operations</a:t>
-            </a:r>
-          </a:p>
-        </p:txBody>
-      </p:sp>
-    </p:spTree>
-    <p:extLst>
-      <p:ext uri="{BB962C8B-B14F-4D97-AF65-F5344CB8AC3E}">
-        <p14:creationId xmlns:p14="http://schemas.microsoft.com/office/powerpoint/2010/main" val="1092238713"/>
-      </p:ext>
-    </p:extLst>
-  </p:cSld>
-  <p:clrMapOvr>
-    <a:masterClrMapping/>
-  </p:clrMapOvr>
-</p:sld>
-</file>
-
-<file path=ppt/slides/slide15.xml><?xml version="1.0" encoding="utf-8"?>
-<p:sld xmlns:a="http://schemas.openxmlformats.org/drawingml/2006/main" xmlns:r="http://schemas.openxmlformats.org/officeDocument/2006/relationships" xmlns:p="http://schemas.openxmlformats.org/presentationml/2006/main">
-  <p:cSld>
-    <p:spTree>
-      <p:nvGrpSpPr>
-        <p:cNvPr id="1" name=""/>
-        <p:cNvGrpSpPr/>
-        <p:nvPr/>
-      </p:nvGrpSpPr>
-      <p:grpSpPr>
-        <a:xfrm>
-          <a:off x="0" y="0"/>
-          <a:ext cx="0" cy="0"/>
-          <a:chOff x="0" y="0"/>
-          <a:chExt cx="0" cy="0"/>
-        </a:xfrm>
-      </p:grpSpPr>
-      <p:sp>
-        <p:nvSpPr>
-          <p:cNvPr id="3" name="Title 2">
-            <a:extLst>
-              <a:ext uri="{FF2B5EF4-FFF2-40B4-BE49-F238E27FC236}">
-                <a16:creationId xmlns:a16="http://schemas.microsoft.com/office/drawing/2014/main" id="{C30ECDC0-2E8C-D34D-983C-2CE74E6E5E77}"/>
-              </a:ext>
-            </a:extLst>
-          </p:cNvPr>
-          <p:cNvSpPr>
-            <a:spLocks noGrp="1"/>
-          </p:cNvSpPr>
-          <p:nvPr>
-            <p:ph type="title"/>
-          </p:nvPr>
-        </p:nvSpPr>
-        <p:spPr/>
-        <p:txBody>
-          <a:bodyPr>
-            <a:normAutofit/>
-          </a:bodyPr>
-          <a:lstStyle/>
-          <a:p>
-            <a:r>
-              <a:rPr lang="en-US" sz="3600" dirty="0"/>
-              <a:t>Graduate Certificates</a:t>
-            </a:r>
-          </a:p>
-        </p:txBody>
-      </p:sp>
-      <p:sp>
-        <p:nvSpPr>
-          <p:cNvPr id="2" name="Rectangle 1">
-            <a:extLst>
-              <a:ext uri="{FF2B5EF4-FFF2-40B4-BE49-F238E27FC236}">
-                <a16:creationId xmlns:a16="http://schemas.microsoft.com/office/drawing/2014/main" id="{809D9325-8FA8-5D4E-9AF6-7625D279A2AA}"/>
-              </a:ext>
-            </a:extLst>
-          </p:cNvPr>
-          <p:cNvSpPr/>
-          <p:nvPr/>
-        </p:nvSpPr>
-        <p:spPr>
-          <a:xfrm>
-            <a:off x="457200" y="1417638"/>
-            <a:ext cx="6783049" cy="3046988"/>
-          </a:xfrm>
-          <a:prstGeom prst="rect">
-            <a:avLst/>
-          </a:prstGeom>
-        </p:spPr>
-        <p:txBody>
-          <a:bodyPr wrap="square">
-            <a:spAutoFit/>
-          </a:bodyPr>
-          <a:lstStyle/>
-          <a:p>
-            <a:pPr marL="285750" indent="-285750">
-              <a:buFont typeface="Arial" panose="020B0604020202020204" pitchFamily="34" charset="0"/>
-              <a:buChar char="•"/>
-            </a:pPr>
-            <a:r>
-              <a:rPr lang="en-US" sz="2400" dirty="0"/>
-              <a:t>Only 4 Classes!</a:t>
-            </a:r>
-          </a:p>
-          <a:p>
-            <a:pPr marL="285750" indent="-285750">
-              <a:buFont typeface="Arial" panose="020B0604020202020204" pitchFamily="34" charset="0"/>
-              <a:buChar char="•"/>
-            </a:pPr>
-            <a:r>
-              <a:rPr lang="en-US" sz="2400" dirty="0"/>
-              <a:t>Obtain as part of your Master’s Degree without taking extra classes</a:t>
-            </a:r>
-          </a:p>
-          <a:p>
-            <a:pPr marL="285750" indent="-285750">
-              <a:buFont typeface="Arial" panose="020B0604020202020204" pitchFamily="34" charset="0"/>
-              <a:buChar char="•"/>
-            </a:pPr>
-            <a:r>
-              <a:rPr lang="en-US" sz="2400" dirty="0"/>
-              <a:t>2.5 Undergraduate GPA required for admission</a:t>
-            </a:r>
-          </a:p>
-          <a:p>
-            <a:pPr marL="285750" indent="-285750">
-              <a:buFont typeface="Arial" panose="020B0604020202020204" pitchFamily="34" charset="0"/>
-              <a:buChar char="•"/>
-            </a:pPr>
-            <a:r>
-              <a:rPr lang="en-US" sz="2400" dirty="0"/>
-              <a:t>No GRE/GMAT</a:t>
-            </a:r>
-          </a:p>
-          <a:p>
-            <a:pPr marL="285750" indent="-285750">
-              <a:buFont typeface="Arial" panose="020B0604020202020204" pitchFamily="34" charset="0"/>
-              <a:buChar char="•"/>
-            </a:pPr>
-            <a:r>
-              <a:rPr lang="en-US" sz="2400" dirty="0"/>
-              <a:t>Classes will double count!</a:t>
-            </a:r>
-          </a:p>
-          <a:p>
-            <a:pPr marL="285750" indent="-285750">
-              <a:buFont typeface="Arial" panose="020B0604020202020204" pitchFamily="34" charset="0"/>
-              <a:buChar char="•"/>
-            </a:pPr>
-            <a:r>
-              <a:rPr lang="en-US" sz="2400" dirty="0"/>
-              <a:t>Can also be completed as stand-alone program</a:t>
-            </a:r>
-          </a:p>
-          <a:p>
-            <a:pPr marL="285750" indent="-285750">
-              <a:buFont typeface="Arial" panose="020B0604020202020204" pitchFamily="34" charset="0"/>
-              <a:buChar char="•"/>
-            </a:pPr>
-            <a:r>
-              <a:rPr lang="en-US" sz="2400" dirty="0"/>
-              <a:t>Transition to MSOM option with no GRE</a:t>
-            </a:r>
-          </a:p>
-        </p:txBody>
-      </p:sp>
-      <p:pic>
-        <p:nvPicPr>
-          <p:cNvPr id="5" name="Picture 4">
-            <a:extLst>
-              <a:ext uri="{FF2B5EF4-FFF2-40B4-BE49-F238E27FC236}">
-                <a16:creationId xmlns:a16="http://schemas.microsoft.com/office/drawing/2014/main" id="{5754C2BC-D088-564F-9B46-844DF74E9E99}"/>
-              </a:ext>
-            </a:extLst>
-          </p:cNvPr>
-          <p:cNvPicPr>
-            <a:picLocks noChangeAspect="1"/>
-          </p:cNvPicPr>
-          <p:nvPr/>
-        </p:nvPicPr>
-        <p:blipFill>
-          <a:blip r:embed="rId2" cstate="email">
-            <a:extLst>
-              <a:ext uri="{28A0092B-C50C-407E-A947-70E740481C1C}">
-                <a14:useLocalDpi xmlns:a14="http://schemas.microsoft.com/office/drawing/2010/main" val="0"/>
-              </a:ext>
-            </a:extLst>
-          </a:blip>
-          <a:stretch>
-            <a:fillRect/>
-          </a:stretch>
-        </p:blipFill>
-        <p:spPr>
-          <a:xfrm>
-            <a:off x="4880224" y="4637862"/>
-            <a:ext cx="3728021" cy="1242674"/>
-          </a:xfrm>
-          <a:prstGeom prst="rect">
-            <a:avLst/>
-          </a:prstGeom>
-        </p:spPr>
-      </p:pic>
-    </p:spTree>
-    <p:extLst>
-      <p:ext uri="{BB962C8B-B14F-4D97-AF65-F5344CB8AC3E}">
-        <p14:creationId xmlns:p14="http://schemas.microsoft.com/office/powerpoint/2010/main" val="3693264188"/>
-      </p:ext>
-    </p:extLst>
-  </p:cSld>
-  <p:clrMapOvr>
-    <a:masterClrMapping/>
-  </p:clrMapOvr>
-</p:sld>
-</file>
-
-<file path=ppt/slides/slide16.xml><?xml version="1.0" encoding="utf-8"?>
-<p:sld xmlns:a="http://schemas.openxmlformats.org/drawingml/2006/main" xmlns:r="http://schemas.openxmlformats.org/officeDocument/2006/relationships" xmlns:p="http://schemas.openxmlformats.org/presentationml/2006/main">
-  <p:cSld>
-    <p:spTree>
-      <p:nvGrpSpPr>
-        <p:cNvPr id="1" name=""/>
-        <p:cNvGrpSpPr/>
-        <p:nvPr/>
-      </p:nvGrpSpPr>
-      <p:grpSpPr>
-        <a:xfrm>
-          <a:off x="0" y="0"/>
-          <a:ext cx="0" cy="0"/>
-          <a:chOff x="0" y="0"/>
-          <a:chExt cx="0" cy="0"/>
-        </a:xfrm>
-      </p:grpSpPr>
-      <p:sp>
-        <p:nvSpPr>
-          <p:cNvPr id="2" name="TextBox 1">
-            <a:extLst>
-              <a:ext uri="{FF2B5EF4-FFF2-40B4-BE49-F238E27FC236}">
-                <a16:creationId xmlns:a16="http://schemas.microsoft.com/office/drawing/2014/main" id="{90B670B6-E007-9843-AC96-A2B2BCF8E42E}"/>
-              </a:ext>
-            </a:extLst>
-          </p:cNvPr>
-          <p:cNvSpPr txBox="1"/>
-          <p:nvPr/>
-        </p:nvSpPr>
-        <p:spPr>
-          <a:xfrm>
-            <a:off x="711200" y="1054100"/>
-            <a:ext cx="7721600" cy="4093428"/>
-          </a:xfrm>
-          <a:prstGeom prst="rect">
-            <a:avLst/>
-          </a:prstGeom>
-          <a:noFill/>
-        </p:spPr>
-        <p:txBody>
-          <a:bodyPr wrap="square" rtlCol="0">
-            <a:spAutoFit/>
-          </a:bodyPr>
-          <a:lstStyle/>
-          <a:p>
-            <a:pPr algn="ctr"/>
-            <a:r>
-              <a:rPr lang="en-US" sz="2600" b="1" dirty="0"/>
-              <a:t>Covid-19 Special Announcement:</a:t>
-            </a:r>
-          </a:p>
-          <a:p>
-            <a:endParaRPr lang="en-US" sz="2600" dirty="0"/>
-          </a:p>
-          <a:p>
-            <a:r>
-              <a:rPr lang="en-US" sz="2600" dirty="0"/>
-              <a:t>Effective for Spring, Summer &amp; Fall 2021 terms, at this time we are waiving the GRE for applicants with a 2.5-2.99 undergraduate GPA. Applicants with above a 3.0 GPA is automatically waived for any term.</a:t>
-            </a:r>
-          </a:p>
-          <a:p>
-            <a:endParaRPr lang="en-US" sz="2600" dirty="0"/>
-          </a:p>
-          <a:p>
-            <a:r>
-              <a:rPr lang="en-US" sz="2600" dirty="0"/>
-              <a:t>Once GRE testing centers resume operations, the standard admissions requirements will go back into full effect.</a:t>
-            </a:r>
-          </a:p>
-        </p:txBody>
-      </p:sp>
-    </p:spTree>
-    <p:extLst>
-      <p:ext uri="{BB962C8B-B14F-4D97-AF65-F5344CB8AC3E}">
-        <p14:creationId xmlns:p14="http://schemas.microsoft.com/office/powerpoint/2010/main" val="3326270327"/>
-      </p:ext>
-    </p:extLst>
-  </p:cSld>
-  <p:clrMapOvr>
-    <a:masterClrMapping/>
-  </p:clrMapOvr>
-</p:sld>
-</file>
-
-<file path=ppt/slides/slide17.xml><?xml version="1.0" encoding="utf-8"?>
-<p:sld xmlns:a="http://schemas.openxmlformats.org/drawingml/2006/main" xmlns:r="http://schemas.openxmlformats.org/officeDocument/2006/relationships" xmlns:p="http://schemas.openxmlformats.org/presentationml/2006/main">
-  <p:cSld>
-    <p:spTree>
-      <p:nvGrpSpPr>
-        <p:cNvPr id="1" name=""/>
-        <p:cNvGrpSpPr/>
-        <p:nvPr/>
-      </p:nvGrpSpPr>
-      <p:grpSpPr>
-        <a:xfrm>
-          <a:off x="0" y="0"/>
-          <a:ext cx="0" cy="0"/>
-          <a:chOff x="0" y="0"/>
-          <a:chExt cx="0" cy="0"/>
-        </a:xfrm>
-      </p:grpSpPr>
-      <p:sp>
-        <p:nvSpPr>
-          <p:cNvPr id="2" name="Title 1"/>
-          <p:cNvSpPr>
-            <a:spLocks noGrp="1"/>
-          </p:cNvSpPr>
-          <p:nvPr>
-            <p:ph type="title"/>
-          </p:nvPr>
-        </p:nvSpPr>
-        <p:spPr>
-          <a:xfrm>
-            <a:off x="4089400" y="1358900"/>
-            <a:ext cx="4696460" cy="1143000"/>
-          </a:xfrm>
-        </p:spPr>
-        <p:txBody>
-          <a:bodyPr>
-            <a:normAutofit fontScale="90000"/>
-          </a:bodyPr>
-          <a:lstStyle/>
-          <a:p>
-            <a:br>
-              <a:rPr lang="en-US" dirty="0">
-                <a:latin typeface="Myriad Pro" panose="020B0703030403020204" pitchFamily="34" charset="0"/>
-              </a:rPr>
-            </a:br>
-            <a:br>
-              <a:rPr lang="en-US" dirty="0">
-                <a:latin typeface="Myriad Pro" panose="020B0703030403020204" pitchFamily="34" charset="0"/>
-              </a:rPr>
-            </a:br>
-            <a:br>
-              <a:rPr lang="en-US" dirty="0">
-                <a:latin typeface="Myriad Pro" panose="020B0703030403020204" pitchFamily="34" charset="0"/>
-              </a:rPr>
-            </a:br>
-            <a:br>
-              <a:rPr lang="en-US" dirty="0">
-                <a:latin typeface="Myriad Pro" panose="020B0703030403020204" pitchFamily="34" charset="0"/>
-              </a:rPr>
-            </a:br>
-            <a:br>
-              <a:rPr lang="en-US" dirty="0">
-                <a:latin typeface="Myriad Pro" panose="020B0703030403020204" pitchFamily="34" charset="0"/>
-              </a:rPr>
-            </a:br>
-            <a:r>
-              <a:rPr lang="en-US" dirty="0">
-                <a:latin typeface="Myriad Pro" panose="020B0703030403020204" pitchFamily="34" charset="0"/>
-              </a:rPr>
-              <a:t>Question and Answer </a:t>
-            </a:r>
-            <a:br>
-              <a:rPr lang="en-US" dirty="0">
-                <a:latin typeface="Myriad Pro" panose="020B0703030403020204" pitchFamily="34" charset="0"/>
-              </a:rPr>
-            </a:br>
-            <a:r>
-              <a:rPr lang="en-US" dirty="0">
-                <a:latin typeface="Myriad Pro" panose="020B0703030403020204" pitchFamily="34" charset="0"/>
-              </a:rPr>
-              <a:t>with Walt</a:t>
-            </a:r>
-            <a:br>
-              <a:rPr lang="en-US" dirty="0">
-                <a:latin typeface="Myriad Pro" panose="020B0703030403020204" pitchFamily="34" charset="0"/>
-              </a:rPr>
-            </a:br>
-            <a:br>
-              <a:rPr lang="en-US" dirty="0">
-                <a:latin typeface="Myriad Pro" panose="020B0703030403020204" pitchFamily="34" charset="0"/>
-              </a:rPr>
-            </a:br>
-            <a:r>
-              <a:rPr lang="en-US" dirty="0">
-                <a:latin typeface="Myriad Pro" panose="020B0703030403020204" pitchFamily="34" charset="0"/>
-              </a:rPr>
-              <a:t>Type your questions in the chat section of this session.</a:t>
-            </a:r>
-            <a:br>
-              <a:rPr lang="en-US" dirty="0">
-                <a:latin typeface="Myriad Pro" panose="020B0703030403020204" pitchFamily="34" charset="0"/>
-              </a:rPr>
-            </a:br>
-            <a:br>
-              <a:rPr lang="en-US" dirty="0">
-                <a:latin typeface="Myriad Pro" panose="020B0703030403020204" pitchFamily="34" charset="0"/>
-              </a:rPr>
-            </a:br>
-            <a:endParaRPr lang="en-US" sz="2200" i="1" dirty="0">
-              <a:solidFill>
-                <a:srgbClr val="FFFF00"/>
-              </a:solidFill>
-              <a:latin typeface="Myriad Pro" panose="020B0703030403020204" pitchFamily="34" charset="0"/>
-            </a:endParaRPr>
-          </a:p>
-        </p:txBody>
-      </p:sp>
-      <p:pic>
-        <p:nvPicPr>
-          <p:cNvPr id="18" name="Picture 17">
-            <a:extLst>
-              <a:ext uri="{FF2B5EF4-FFF2-40B4-BE49-F238E27FC236}">
-                <a16:creationId xmlns:a16="http://schemas.microsoft.com/office/drawing/2014/main" id="{677929AC-B14A-584F-BBDB-8D97E20344AA}"/>
-              </a:ext>
-            </a:extLst>
-          </p:cNvPr>
-          <p:cNvPicPr>
-            <a:picLocks noChangeAspect="1"/>
-          </p:cNvPicPr>
-          <p:nvPr/>
-        </p:nvPicPr>
-        <p:blipFill>
-          <a:blip r:embed="rId2" cstate="email">
-            <a:extLst>
-              <a:ext uri="{28A0092B-C50C-407E-A947-70E740481C1C}">
-                <a14:useLocalDpi xmlns:a14="http://schemas.microsoft.com/office/drawing/2010/main" val="0"/>
-              </a:ext>
-              <a:ext uri="{837473B0-CC2E-450A-ABE3-18F120FF3D39}">
-                <a1611:picAttrSrcUrl xmlns:a1611="http://schemas.microsoft.com/office/drawing/2016/11/main" r:id="rId3"/>
-              </a:ext>
-            </a:extLst>
-          </a:blip>
-          <a:stretch>
-            <a:fillRect/>
-          </a:stretch>
-        </p:blipFill>
-        <p:spPr>
-          <a:xfrm>
-            <a:off x="177800" y="1586249"/>
-            <a:ext cx="3911600" cy="2324517"/>
-          </a:xfrm>
-          <a:prstGeom prst="rect">
-            <a:avLst/>
-          </a:prstGeom>
-        </p:spPr>
-      </p:pic>
-      <p:pic>
-        <p:nvPicPr>
-          <p:cNvPr id="21" name="Picture 20">
-            <a:extLst>
-              <a:ext uri="{FF2B5EF4-FFF2-40B4-BE49-F238E27FC236}">
-                <a16:creationId xmlns:a16="http://schemas.microsoft.com/office/drawing/2014/main" id="{6BCE5B58-8603-E841-B6A3-3EE1D7AC5DCA}"/>
-              </a:ext>
-            </a:extLst>
-          </p:cNvPr>
-          <p:cNvPicPr>
-            <a:picLocks noChangeAspect="1"/>
-          </p:cNvPicPr>
-          <p:nvPr/>
-        </p:nvPicPr>
-        <p:blipFill rotWithShape="1">
-          <a:blip r:embed="rId4">
-            <a:extLst>
-              <a:ext uri="{28A0092B-C50C-407E-A947-70E740481C1C}">
-                <a14:useLocalDpi xmlns:a14="http://schemas.microsoft.com/office/drawing/2010/main" val="0"/>
-              </a:ext>
-            </a:extLst>
-          </a:blip>
-          <a:srcRect t="7058"/>
-          <a:stretch/>
-        </p:blipFill>
-        <p:spPr>
-          <a:xfrm>
-            <a:off x="4572000" y="5073917"/>
-            <a:ext cx="3911600" cy="602726"/>
-          </a:xfrm>
-          <a:prstGeom prst="rect">
-            <a:avLst/>
-          </a:prstGeom>
-        </p:spPr>
-      </p:pic>
-      <p:sp>
-        <p:nvSpPr>
-          <p:cNvPr id="22" name="Oval 21">
-            <a:extLst>
-              <a:ext uri="{FF2B5EF4-FFF2-40B4-BE49-F238E27FC236}">
-                <a16:creationId xmlns:a16="http://schemas.microsoft.com/office/drawing/2014/main" id="{B9D0887D-5843-4947-8F1D-8548A545824C}"/>
-              </a:ext>
-            </a:extLst>
-          </p:cNvPr>
-          <p:cNvSpPr/>
-          <p:nvPr/>
-        </p:nvSpPr>
-        <p:spPr>
-          <a:xfrm>
-            <a:off x="4546600" y="4997588"/>
-            <a:ext cx="838200" cy="742555"/>
-          </a:xfrm>
-          <a:prstGeom prst="ellipse">
-            <a:avLst/>
-          </a:prstGeom>
-          <a:noFill/>
-          <a:ln>
-            <a:solidFill>
-              <a:schemeClr val="bg2">
-                <a:lumMod val="75000"/>
-              </a:schemeClr>
-            </a:solidFill>
-          </a:ln>
-        </p:spPr>
-        <p:style>
-          <a:lnRef idx="2">
-            <a:schemeClr val="accent1">
-              <a:shade val="50000"/>
-            </a:schemeClr>
-          </a:lnRef>
-          <a:fillRef idx="1">
-            <a:schemeClr val="accent1"/>
-          </a:fillRef>
-          <a:effectRef idx="0">
-            <a:schemeClr val="accent1"/>
-          </a:effectRef>
-          <a:fontRef idx="minor">
-            <a:schemeClr val="lt1"/>
-          </a:fontRef>
-        </p:style>
-        <p:txBody>
-          <a:bodyPr rtlCol="0" anchor="ctr"/>
-          <a:lstStyle/>
-          <a:p>
-            <a:pPr algn="ctr"/>
-            <a:endParaRPr lang="en-US"/>
-          </a:p>
-        </p:txBody>
-      </p:sp>
-    </p:spTree>
-    <p:extLst>
-      <p:ext uri="{BB962C8B-B14F-4D97-AF65-F5344CB8AC3E}">
-        <p14:creationId xmlns:p14="http://schemas.microsoft.com/office/powerpoint/2010/main" val="1581492620"/>
-      </p:ext>
-    </p:extLst>
-  </p:cSld>
-  <p:clrMapOvr>
-    <a:masterClrMapping/>
-  </p:clrMapOvr>
-</p:sld>
-</file>
-
-<file path=ppt/slides/slide18.xml><?xml version="1.0" encoding="utf-8"?>
-<p:sld xmlns:a="http://schemas.openxmlformats.org/drawingml/2006/main" xmlns:r="http://schemas.openxmlformats.org/officeDocument/2006/relationships" xmlns:p="http://schemas.openxmlformats.org/presentationml/2006/main">
-  <p:cSld>
-    <p:spTree>
-      <p:nvGrpSpPr>
-        <p:cNvPr id="1" name=""/>
-        <p:cNvGrpSpPr/>
-        <p:nvPr/>
-      </p:nvGrpSpPr>
-      <p:grpSpPr>
-        <a:xfrm>
-          <a:off x="0" y="0"/>
-          <a:ext cx="0" cy="0"/>
-          <a:chOff x="0" y="0"/>
-          <a:chExt cx="0" cy="0"/>
-        </a:xfrm>
-      </p:grpSpPr>
-      <p:sp>
-        <p:nvSpPr>
-          <p:cNvPr id="2" name="Title 1"/>
-          <p:cNvSpPr>
-            <a:spLocks noGrp="1"/>
-          </p:cNvSpPr>
-          <p:nvPr>
-            <p:ph type="title"/>
-          </p:nvPr>
-        </p:nvSpPr>
-        <p:spPr>
-          <a:xfrm>
-            <a:off x="457201" y="122238"/>
-            <a:ext cx="8229600" cy="1143000"/>
-          </a:xfrm>
-        </p:spPr>
-        <p:txBody>
-          <a:bodyPr anchor="t" anchorCtr="0">
-            <a:normAutofit fontScale="90000"/>
-          </a:bodyPr>
-          <a:lstStyle/>
-          <a:p>
-            <a:r>
-              <a:rPr lang="en-US" b="1" cap="small" dirty="0"/>
-              <a:t>Next Webinar:</a:t>
-            </a:r>
-            <a:br>
-              <a:rPr lang="en-US" dirty="0"/>
-            </a:br>
-            <a:endParaRPr lang="en-US" b="1" cap="small" dirty="0"/>
-          </a:p>
-        </p:txBody>
-      </p:sp>
-      <p:sp>
-        <p:nvSpPr>
-          <p:cNvPr id="3" name="Content Placeholder 2"/>
-          <p:cNvSpPr>
-            <a:spLocks noGrp="1"/>
-          </p:cNvSpPr>
-          <p:nvPr>
-            <p:ph idx="1"/>
-          </p:nvPr>
-        </p:nvSpPr>
-        <p:spPr>
-          <a:xfrm>
-            <a:off x="179797" y="933797"/>
-            <a:ext cx="8784404" cy="1844310"/>
-          </a:xfrm>
-        </p:spPr>
-        <p:txBody>
-          <a:bodyPr>
-            <a:noAutofit/>
-          </a:bodyPr>
-          <a:lstStyle/>
-          <a:p>
-            <a:pPr marL="0" indent="0" algn="ctr">
-              <a:buNone/>
-            </a:pPr>
-            <a:r>
-              <a:rPr lang="en-US" sz="2400" b="1" u="sng" dirty="0"/>
-              <a:t>Agile Project Management &amp; Innovative Technology Development</a:t>
-            </a:r>
-          </a:p>
-          <a:p>
-            <a:pPr marL="0" indent="0" algn="ctr">
-              <a:buNone/>
-            </a:pPr>
-            <a:r>
-              <a:rPr lang="en-US" sz="2400" dirty="0"/>
-              <a:t>Presented by: Dr. Rocky Gay</a:t>
-            </a:r>
-          </a:p>
-        </p:txBody>
-      </p:sp>
-      <p:sp>
-        <p:nvSpPr>
-          <p:cNvPr id="6" name="Content Placeholder 2">
-            <a:extLst>
-              <a:ext uri="{FF2B5EF4-FFF2-40B4-BE49-F238E27FC236}">
-                <a16:creationId xmlns:a16="http://schemas.microsoft.com/office/drawing/2014/main" id="{D1ADBA88-3F2A-CF4F-B907-3EE6AC46668E}"/>
-              </a:ext>
-            </a:extLst>
-          </p:cNvPr>
-          <p:cNvSpPr txBox="1">
-            <a:spLocks/>
-          </p:cNvSpPr>
-          <p:nvPr/>
-        </p:nvSpPr>
-        <p:spPr>
-          <a:xfrm>
-            <a:off x="760289" y="2678889"/>
-            <a:ext cx="7926512" cy="3382962"/>
-          </a:xfrm>
-          <a:prstGeom prst="rect">
-            <a:avLst/>
-          </a:prstGeom>
-        </p:spPr>
-        <p:txBody>
-          <a:bodyPr vert="horz" lIns="91440" tIns="45720" rIns="91440" bIns="45720" rtlCol="0">
-            <a:normAutofit/>
-          </a:bodyPr>
-          <a:lstStyle>
-            <a:lvl1pPr marL="342900" indent="-342900" algn="l" defTabSz="914400" rtl="0" eaLnBrk="1" latinLnBrk="0" hangingPunct="1">
-              <a:spcBef>
-                <a:spcPct val="20000"/>
-              </a:spcBef>
-              <a:buFont typeface="Arial" pitchFamily="34" charset="0"/>
-              <a:buChar char="•"/>
-              <a:defRPr sz="3200" kern="1200">
-                <a:solidFill>
-                  <a:schemeClr val="tx1"/>
-                </a:solidFill>
-                <a:latin typeface="+mn-lt"/>
-                <a:ea typeface="+mn-ea"/>
-                <a:cs typeface="+mn-cs"/>
-              </a:defRPr>
-            </a:lvl1pPr>
-            <a:lvl2pPr marL="742950" indent="-285750" algn="l" defTabSz="914400" rtl="0" eaLnBrk="1" latinLnBrk="0" hangingPunct="1">
-              <a:spcBef>
-                <a:spcPct val="20000"/>
-              </a:spcBef>
-              <a:buFont typeface="Arial" pitchFamily="34" charset="0"/>
-              <a:buChar char="–"/>
-              <a:defRPr sz="2800" kern="1200">
-                <a:solidFill>
-                  <a:schemeClr val="tx1"/>
-                </a:solidFill>
-                <a:latin typeface="+mn-lt"/>
-                <a:ea typeface="+mn-ea"/>
-                <a:cs typeface="+mn-cs"/>
-              </a:defRPr>
-            </a:lvl2pPr>
-            <a:lvl3pPr marL="1143000" indent="-228600" algn="l" defTabSz="914400" rtl="0" eaLnBrk="1" latinLnBrk="0" hangingPunct="1">
-              <a:spcBef>
-                <a:spcPct val="20000"/>
-              </a:spcBef>
-              <a:buFont typeface="Arial" pitchFamily="34" charset="0"/>
-              <a:buChar char="•"/>
-              <a:defRPr sz="2400" kern="1200">
-                <a:solidFill>
-                  <a:schemeClr val="tx1"/>
-                </a:solidFill>
-                <a:latin typeface="+mn-lt"/>
-                <a:ea typeface="+mn-ea"/>
-                <a:cs typeface="+mn-cs"/>
-              </a:defRPr>
-            </a:lvl3pPr>
-            <a:lvl4pPr marL="1600200" indent="-228600" algn="l" defTabSz="914400" rtl="0" eaLnBrk="1" latinLnBrk="0" hangingPunct="1">
-              <a:spcBef>
-                <a:spcPct val="20000"/>
-              </a:spcBef>
-              <a:buFont typeface="Arial" pitchFamily="34" charset="0"/>
-              <a:buChar char="–"/>
-              <a:defRPr sz="2000" kern="1200">
-                <a:solidFill>
-                  <a:schemeClr val="tx1"/>
-                </a:solidFill>
-                <a:latin typeface="+mn-lt"/>
-                <a:ea typeface="+mn-ea"/>
-                <a:cs typeface="+mn-cs"/>
-              </a:defRPr>
-            </a:lvl4pPr>
-            <a:lvl5pPr marL="2057400" indent="-228600" algn="l" defTabSz="914400" rtl="0" eaLnBrk="1" latinLnBrk="0" hangingPunct="1">
-              <a:spcBef>
-                <a:spcPct val="20000"/>
-              </a:spcBef>
-              <a:buFont typeface="Arial" pitchFamily="34" charset="0"/>
-              <a:buChar char="»"/>
-              <a:defRPr sz="2000" kern="1200">
-                <a:solidFill>
-                  <a:schemeClr val="tx1"/>
-                </a:solidFill>
-                <a:latin typeface="+mn-lt"/>
-                <a:ea typeface="+mn-ea"/>
-                <a:cs typeface="+mn-cs"/>
-              </a:defRPr>
-            </a:lvl5pPr>
-            <a:lvl6pPr marL="2514600" indent="-228600" algn="l" defTabSz="914400" rtl="0" eaLnBrk="1" latinLnBrk="0" hangingPunct="1">
-              <a:spcBef>
-                <a:spcPct val="20000"/>
-              </a:spcBef>
-              <a:buFont typeface="Arial" pitchFamily="34" charset="0"/>
-              <a:buChar char="•"/>
-              <a:defRPr sz="2000" kern="1200">
-                <a:solidFill>
-                  <a:schemeClr val="tx1"/>
-                </a:solidFill>
-                <a:latin typeface="+mn-lt"/>
-                <a:ea typeface="+mn-ea"/>
-                <a:cs typeface="+mn-cs"/>
-              </a:defRPr>
-            </a:lvl6pPr>
-            <a:lvl7pPr marL="2971800" indent="-228600" algn="l" defTabSz="914400" rtl="0" eaLnBrk="1" latinLnBrk="0" hangingPunct="1">
-              <a:spcBef>
-                <a:spcPct val="20000"/>
-              </a:spcBef>
-              <a:buFont typeface="Arial" pitchFamily="34" charset="0"/>
-              <a:buChar char="•"/>
-              <a:defRPr sz="2000" kern="1200">
-                <a:solidFill>
-                  <a:schemeClr val="tx1"/>
-                </a:solidFill>
-                <a:latin typeface="+mn-lt"/>
-                <a:ea typeface="+mn-ea"/>
-                <a:cs typeface="+mn-cs"/>
-              </a:defRPr>
-            </a:lvl7pPr>
-            <a:lvl8pPr marL="3429000" indent="-228600" algn="l" defTabSz="914400" rtl="0" eaLnBrk="1" latinLnBrk="0" hangingPunct="1">
-              <a:spcBef>
-                <a:spcPct val="20000"/>
-              </a:spcBef>
-              <a:buFont typeface="Arial" pitchFamily="34" charset="0"/>
-              <a:buChar char="•"/>
-              <a:defRPr sz="2000" kern="1200">
-                <a:solidFill>
-                  <a:schemeClr val="tx1"/>
-                </a:solidFill>
-                <a:latin typeface="+mn-lt"/>
-                <a:ea typeface="+mn-ea"/>
-                <a:cs typeface="+mn-cs"/>
-              </a:defRPr>
-            </a:lvl8pPr>
-            <a:lvl9pPr marL="3886200" indent="-228600" algn="l" defTabSz="914400" rtl="0" eaLnBrk="1" latinLnBrk="0" hangingPunct="1">
-              <a:spcBef>
-                <a:spcPct val="20000"/>
-              </a:spcBef>
-              <a:buFont typeface="Arial" pitchFamily="34" charset="0"/>
-              <a:buChar char="•"/>
-              <a:defRPr sz="2000" kern="1200">
-                <a:solidFill>
-                  <a:schemeClr val="tx1"/>
-                </a:solidFill>
-                <a:latin typeface="+mn-lt"/>
-                <a:ea typeface="+mn-ea"/>
-                <a:cs typeface="+mn-cs"/>
-              </a:defRPr>
-            </a:lvl9pPr>
-          </a:lstStyle>
-          <a:p>
-            <a:r>
-              <a:rPr lang="en-US" sz="2400" dirty="0"/>
-              <a:t>For information about our flexible degree program options, email Karin </a:t>
-            </a:r>
-            <a:r>
-              <a:rPr lang="en-US" sz="2400" dirty="0" err="1"/>
-              <a:t>Hickenbotham</a:t>
-            </a:r>
-            <a:r>
-              <a:rPr lang="en-US" sz="2400" dirty="0"/>
-              <a:t> </a:t>
-            </a:r>
-            <a:r>
-              <a:rPr lang="en-US" sz="2400" dirty="0">
-                <a:hlinkClick r:id="rId2"/>
-              </a:rPr>
-              <a:t>kahicken@uark.edu</a:t>
-            </a:r>
-            <a:br>
-              <a:rPr lang="en-US" sz="2400" dirty="0"/>
-            </a:br>
-            <a:r>
-              <a:rPr lang="en-US" sz="2400" dirty="0"/>
-              <a:t>or visit operations-</a:t>
-            </a:r>
-            <a:r>
-              <a:rPr lang="en-US" sz="2400" dirty="0" err="1"/>
-              <a:t>management.uark.edu</a:t>
-            </a:r>
-            <a:br>
-              <a:rPr lang="en-US" sz="2400" dirty="0">
-                <a:solidFill>
-                  <a:srgbClr val="FFFF00"/>
-                </a:solidFill>
-              </a:rPr>
-            </a:br>
-            <a:endParaRPr lang="en-US" sz="2400" dirty="0">
-              <a:solidFill>
-                <a:srgbClr val="FFFF00"/>
-              </a:solidFill>
-            </a:endParaRPr>
-          </a:p>
-          <a:p>
-            <a:r>
-              <a:rPr lang="en-US" sz="2400" i="1" u="sng" dirty="0"/>
-              <a:t>Registered</a:t>
-            </a:r>
-            <a:r>
-              <a:rPr lang="en-US" sz="2400" dirty="0"/>
-              <a:t> participants will receive an email with the video link to this webinar.</a:t>
-            </a:r>
-          </a:p>
-          <a:p>
-            <a:pPr marL="0" indent="0">
-              <a:buFont typeface="Arial" pitchFamily="34" charset="0"/>
-              <a:buNone/>
-            </a:pPr>
-            <a:endParaRPr lang="en-US" sz="2400" dirty="0"/>
-          </a:p>
-          <a:p>
-            <a:r>
-              <a:rPr lang="en-US" sz="2400" dirty="0"/>
-              <a:t>We hope to see you online next month!</a:t>
-            </a:r>
-          </a:p>
-          <a:p>
-            <a:pPr marL="0" indent="0">
-              <a:buFont typeface="Arial" pitchFamily="34" charset="0"/>
-              <a:buNone/>
-            </a:pPr>
-            <a:endParaRPr lang="en-US" sz="2400" dirty="0"/>
-          </a:p>
-        </p:txBody>
-      </p:sp>
-      <p:sp>
-        <p:nvSpPr>
-          <p:cNvPr id="7" name="Title 1">
-            <a:extLst>
-              <a:ext uri="{FF2B5EF4-FFF2-40B4-BE49-F238E27FC236}">
-                <a16:creationId xmlns:a16="http://schemas.microsoft.com/office/drawing/2014/main" id="{8CA64514-7A8D-2041-9148-A329EC49F13C}"/>
-              </a:ext>
-            </a:extLst>
-          </p:cNvPr>
-          <p:cNvSpPr txBox="1">
-            <a:spLocks/>
-          </p:cNvSpPr>
-          <p:nvPr/>
-        </p:nvSpPr>
-        <p:spPr>
-          <a:xfrm>
-            <a:off x="1718353" y="2311686"/>
-            <a:ext cx="5707293" cy="367203"/>
-          </a:xfrm>
-          <a:prstGeom prst="rect">
-            <a:avLst/>
-          </a:prstGeom>
-        </p:spPr>
-        <p:txBody>
-          <a:bodyPr vert="horz" lIns="91440" tIns="45720" rIns="91440" bIns="45720" rtlCol="0" anchor="ctr">
-            <a:noAutofit/>
-          </a:bodyPr>
-          <a:lstStyle>
-            <a:lvl1pPr algn="ctr" defTabSz="914400" rtl="0" eaLnBrk="1" latinLnBrk="0" hangingPunct="1">
-              <a:spcBef>
-                <a:spcPct val="0"/>
-              </a:spcBef>
-              <a:buNone/>
-              <a:defRPr sz="4400" kern="1200">
-                <a:solidFill>
-                  <a:schemeClr val="tx1"/>
-                </a:solidFill>
-                <a:latin typeface="+mj-lt"/>
-                <a:ea typeface="+mj-ea"/>
-                <a:cs typeface="+mj-cs"/>
-              </a:defRPr>
-            </a:lvl1pPr>
-          </a:lstStyle>
-          <a:p>
-            <a:r>
-              <a:rPr lang="en-US" sz="2400" cap="small" dirty="0"/>
-              <a:t>Thanks for attending!</a:t>
-            </a:r>
-          </a:p>
-        </p:txBody>
-      </p:sp>
-      <p:cxnSp>
-        <p:nvCxnSpPr>
-          <p:cNvPr id="9" name="Straight Connector 8">
-            <a:extLst>
-              <a:ext uri="{FF2B5EF4-FFF2-40B4-BE49-F238E27FC236}">
-                <a16:creationId xmlns:a16="http://schemas.microsoft.com/office/drawing/2014/main" id="{0BA8E8C0-6859-624C-BAD6-A2FAA1AC4380}"/>
-              </a:ext>
-            </a:extLst>
-          </p:cNvPr>
-          <p:cNvCxnSpPr/>
-          <p:nvPr/>
-        </p:nvCxnSpPr>
-        <p:spPr>
-          <a:xfrm>
-            <a:off x="760289" y="2088174"/>
-            <a:ext cx="7510408" cy="0"/>
-          </a:xfrm>
-          <a:prstGeom prst="line">
-            <a:avLst/>
-          </a:prstGeom>
-        </p:spPr>
-        <p:style>
-          <a:lnRef idx="1">
-            <a:schemeClr val="accent1"/>
-          </a:lnRef>
-          <a:fillRef idx="0">
-            <a:schemeClr val="accent1"/>
-          </a:fillRef>
-          <a:effectRef idx="0">
-            <a:schemeClr val="accent1"/>
-          </a:effectRef>
-          <a:fontRef idx="minor">
-            <a:schemeClr val="tx1"/>
-          </a:fontRef>
-        </p:style>
-      </p:cxnSp>
-    </p:spTree>
-    <p:extLst>
-      <p:ext uri="{BB962C8B-B14F-4D97-AF65-F5344CB8AC3E}">
-        <p14:creationId xmlns:p14="http://schemas.microsoft.com/office/powerpoint/2010/main" val="2145854633"/>
-      </p:ext>
-    </p:extLst>
-  </p:cSld>
-  <p:clrMapOvr>
-    <a:masterClrMapping/>
-  </p:clrMapOvr>
-</p:sld>
-</file>
-
-<file path=ppt/slides/slide2.xml><?xml version="1.0" encoding="utf-8"?>
-<p:sld xmlns:a="http://schemas.openxmlformats.org/drawingml/2006/main" xmlns:r="http://schemas.openxmlformats.org/officeDocument/2006/relationships" xmlns:p="http://schemas.openxmlformats.org/presentationml/2006/main">
-  <p:cSld>
-    <p:spTree>
-      <p:nvGrpSpPr>
-        <p:cNvPr id="1" name=""/>
-        <p:cNvGrpSpPr/>
-        <p:nvPr/>
-      </p:nvGrpSpPr>
-      <p:grpSpPr>
-        <a:xfrm>
-          <a:off x="0" y="0"/>
-          <a:ext cx="0" cy="0"/>
-          <a:chOff x="0" y="0"/>
-          <a:chExt cx="0" cy="0"/>
-        </a:xfrm>
-      </p:grpSpPr>
-      <p:sp>
-        <p:nvSpPr>
-          <p:cNvPr id="18" name="TextBox 17">
-            <a:extLst>
-              <a:ext uri="{FF2B5EF4-FFF2-40B4-BE49-F238E27FC236}">
-                <a16:creationId xmlns:a16="http://schemas.microsoft.com/office/drawing/2014/main" id="{859C8C49-37F5-4D41-915B-CF64C371F781}"/>
-              </a:ext>
-            </a:extLst>
-          </p:cNvPr>
-          <p:cNvSpPr txBox="1"/>
-          <p:nvPr/>
-        </p:nvSpPr>
-        <p:spPr>
-          <a:xfrm>
-            <a:off x="989351" y="1872391"/>
-            <a:ext cx="7277724" cy="2554545"/>
-          </a:xfrm>
-          <a:prstGeom prst="rect">
-            <a:avLst/>
-          </a:prstGeom>
-          <a:noFill/>
-        </p:spPr>
-        <p:txBody>
-          <a:bodyPr wrap="square" rtlCol="0">
-            <a:spAutoFit/>
-          </a:bodyPr>
-          <a:lstStyle/>
-          <a:p>
-            <a:pPr algn="ctr"/>
-            <a:r>
-              <a:rPr lang="en-US" sz="1700" dirty="0"/>
-              <a:t>Please save all questions until the end of the presentation. </a:t>
-            </a:r>
-          </a:p>
-          <a:p>
-            <a:pPr algn="ctr"/>
-            <a:endParaRPr lang="en-US" sz="1700" dirty="0"/>
-          </a:p>
-          <a:p>
-            <a:pPr algn="ctr"/>
-            <a:r>
-              <a:rPr lang="en-US" sz="1700" dirty="0"/>
-              <a:t>Please do not use the “Raise Hand” feature in this session. </a:t>
-            </a:r>
-          </a:p>
-          <a:p>
-            <a:pPr algn="ctr"/>
-            <a:endParaRPr lang="en-US" sz="1700" dirty="0"/>
-          </a:p>
-          <a:p>
-            <a:pPr algn="ctr"/>
-            <a:r>
-              <a:rPr lang="en-US" sz="1700" dirty="0"/>
-              <a:t>We ask all questions will be typed in the Chat Box at the end of the presentation. </a:t>
-            </a:r>
-          </a:p>
-          <a:p>
-            <a:pPr algn="ctr"/>
-            <a:endParaRPr lang="en-US" sz="1700" dirty="0"/>
-          </a:p>
-          <a:p>
-            <a:pPr algn="ctr"/>
-            <a:r>
-              <a:rPr lang="en-US" sz="1700" dirty="0"/>
-              <a:t>THANK YOU!</a:t>
-            </a:r>
-          </a:p>
-          <a:p>
-            <a:pPr algn="ctr"/>
-            <a:endParaRPr lang="en-US" sz="1700" dirty="0"/>
-          </a:p>
-          <a:p>
-            <a:pPr algn="ctr"/>
-            <a:r>
-              <a:rPr lang="en-US" sz="2400" dirty="0"/>
-              <a:t>LET’S GET STARTED!</a:t>
-            </a:r>
-          </a:p>
-        </p:txBody>
-      </p:sp>
-    </p:spTree>
-    <p:extLst>
-      <p:ext uri="{BB962C8B-B14F-4D97-AF65-F5344CB8AC3E}">
-        <p14:creationId xmlns:p14="http://schemas.microsoft.com/office/powerpoint/2010/main" val="1164015114"/>
+        <p14:creationId xmlns:p14="http://schemas.microsoft.com/office/powerpoint/2010/main" val="2966916607"/>
       </p:ext>
     </p:extLst>
   </p:cSld>
@@ -5688,337 +3721,6 @@
 </file>
 
 <file path=ppt/slides/slide3.xml><?xml version="1.0" encoding="utf-8"?>
-<p:sld xmlns:a="http://schemas.openxmlformats.org/drawingml/2006/main" xmlns:r="http://schemas.openxmlformats.org/officeDocument/2006/relationships" xmlns:p="http://schemas.openxmlformats.org/presentationml/2006/main">
-  <p:cSld>
-    <p:spTree>
-      <p:nvGrpSpPr>
-        <p:cNvPr id="1" name=""/>
-        <p:cNvGrpSpPr/>
-        <p:nvPr/>
-      </p:nvGrpSpPr>
-      <p:grpSpPr>
-        <a:xfrm>
-          <a:off x="0" y="0"/>
-          <a:ext cx="0" cy="0"/>
-          <a:chOff x="0" y="0"/>
-          <a:chExt cx="0" cy="0"/>
-        </a:xfrm>
-      </p:grpSpPr>
-      <p:sp>
-        <p:nvSpPr>
-          <p:cNvPr id="7" name="Title 6">
-            <a:extLst>
-              <a:ext uri="{FF2B5EF4-FFF2-40B4-BE49-F238E27FC236}">
-                <a16:creationId xmlns:a16="http://schemas.microsoft.com/office/drawing/2014/main" id="{30235B5E-B681-0248-B5DF-3480B2E1E748}"/>
-              </a:ext>
-            </a:extLst>
-          </p:cNvPr>
-          <p:cNvSpPr>
-            <a:spLocks noGrp="1"/>
-          </p:cNvSpPr>
-          <p:nvPr>
-            <p:ph type="title"/>
-          </p:nvPr>
-        </p:nvSpPr>
-        <p:spPr/>
-        <p:txBody>
-          <a:bodyPr>
-            <a:normAutofit fontScale="90000"/>
-          </a:bodyPr>
-          <a:lstStyle/>
-          <a:p>
-            <a:r>
-              <a:rPr lang="en-US" sz="3600"/>
-              <a:t>College of Engineering &amp; Industrial Engineering Programs</a:t>
-            </a:r>
-            <a:endParaRPr lang="en-US" sz="3600" dirty="0"/>
-          </a:p>
-        </p:txBody>
-      </p:sp>
-      <p:sp>
-        <p:nvSpPr>
-          <p:cNvPr id="5" name="Content Placeholder 2">
-            <a:extLst>
-              <a:ext uri="{FF2B5EF4-FFF2-40B4-BE49-F238E27FC236}">
-                <a16:creationId xmlns:a16="http://schemas.microsoft.com/office/drawing/2014/main" id="{D0C2378F-F6C5-2541-9541-2C6035648AA5}"/>
-              </a:ext>
-            </a:extLst>
-          </p:cNvPr>
-          <p:cNvSpPr txBox="1">
-            <a:spLocks/>
-          </p:cNvSpPr>
-          <p:nvPr/>
-        </p:nvSpPr>
-        <p:spPr>
-          <a:xfrm>
-            <a:off x="1348353" y="1987337"/>
-            <a:ext cx="7467600" cy="3865531"/>
-          </a:xfrm>
-          <a:prstGeom prst="rect">
-            <a:avLst/>
-          </a:prstGeom>
-        </p:spPr>
-        <p:txBody>
-          <a:bodyPr>
-            <a:normAutofit/>
-          </a:bodyPr>
-          <a:lstStyle>
-            <a:lvl1pPr marL="342900" indent="-342900" algn="l" defTabSz="457200" rtl="0" eaLnBrk="1" latinLnBrk="0" hangingPunct="1">
-              <a:spcBef>
-                <a:spcPct val="20000"/>
-              </a:spcBef>
-              <a:buFont typeface="Arial"/>
-              <a:buChar char="•"/>
-              <a:defRPr sz="3200" kern="1200">
-                <a:solidFill>
-                  <a:schemeClr val="tx1"/>
-                </a:solidFill>
-                <a:latin typeface="+mn-lt"/>
-                <a:ea typeface="+mn-ea"/>
-                <a:cs typeface="+mn-cs"/>
-              </a:defRPr>
-            </a:lvl1pPr>
-            <a:lvl2pPr marL="742950" indent="-285750" algn="l" defTabSz="457200" rtl="0" eaLnBrk="1" latinLnBrk="0" hangingPunct="1">
-              <a:spcBef>
-                <a:spcPct val="20000"/>
-              </a:spcBef>
-              <a:buFont typeface="Arial"/>
-              <a:buChar char="–"/>
-              <a:defRPr sz="2800" kern="1200">
-                <a:solidFill>
-                  <a:schemeClr val="tx1"/>
-                </a:solidFill>
-                <a:latin typeface="+mn-lt"/>
-                <a:ea typeface="+mn-ea"/>
-                <a:cs typeface="+mn-cs"/>
-              </a:defRPr>
-            </a:lvl2pPr>
-            <a:lvl3pPr marL="1143000" indent="-228600" algn="l" defTabSz="457200" rtl="0" eaLnBrk="1" latinLnBrk="0" hangingPunct="1">
-              <a:spcBef>
-                <a:spcPct val="20000"/>
-              </a:spcBef>
-              <a:buFont typeface="Arial"/>
-              <a:buChar char="•"/>
-              <a:defRPr sz="2400" kern="1200">
-                <a:solidFill>
-                  <a:schemeClr val="tx1"/>
-                </a:solidFill>
-                <a:latin typeface="+mn-lt"/>
-                <a:ea typeface="+mn-ea"/>
-                <a:cs typeface="+mn-cs"/>
-              </a:defRPr>
-            </a:lvl3pPr>
-            <a:lvl4pPr marL="1600200" indent="-228600" algn="l" defTabSz="457200" rtl="0" eaLnBrk="1" latinLnBrk="0" hangingPunct="1">
-              <a:spcBef>
-                <a:spcPct val="20000"/>
-              </a:spcBef>
-              <a:buFont typeface="Arial"/>
-              <a:buChar char="–"/>
-              <a:defRPr sz="2000" kern="1200">
-                <a:solidFill>
-                  <a:schemeClr val="tx1"/>
-                </a:solidFill>
-                <a:latin typeface="+mn-lt"/>
-                <a:ea typeface="+mn-ea"/>
-                <a:cs typeface="+mn-cs"/>
-              </a:defRPr>
-            </a:lvl4pPr>
-            <a:lvl5pPr marL="2057400" indent="-228600" algn="l" defTabSz="457200" rtl="0" eaLnBrk="1" latinLnBrk="0" hangingPunct="1">
-              <a:spcBef>
-                <a:spcPct val="20000"/>
-              </a:spcBef>
-              <a:buFont typeface="Arial"/>
-              <a:buChar char="»"/>
-              <a:defRPr sz="2000" kern="1200">
-                <a:solidFill>
-                  <a:schemeClr val="tx1"/>
-                </a:solidFill>
-                <a:latin typeface="+mn-lt"/>
-                <a:ea typeface="+mn-ea"/>
-                <a:cs typeface="+mn-cs"/>
-              </a:defRPr>
-            </a:lvl5pPr>
-            <a:lvl6pPr marL="2514600" indent="-228600" algn="l" defTabSz="457200" rtl="0" eaLnBrk="1" latinLnBrk="0" hangingPunct="1">
-              <a:spcBef>
-                <a:spcPct val="20000"/>
-              </a:spcBef>
-              <a:buFont typeface="Arial"/>
-              <a:buChar char="•"/>
-              <a:defRPr sz="2000" kern="1200">
-                <a:solidFill>
-                  <a:schemeClr val="tx1"/>
-                </a:solidFill>
-                <a:latin typeface="+mn-lt"/>
-                <a:ea typeface="+mn-ea"/>
-                <a:cs typeface="+mn-cs"/>
-              </a:defRPr>
-            </a:lvl6pPr>
-            <a:lvl7pPr marL="2971800" indent="-228600" algn="l" defTabSz="457200" rtl="0" eaLnBrk="1" latinLnBrk="0" hangingPunct="1">
-              <a:spcBef>
-                <a:spcPct val="20000"/>
-              </a:spcBef>
-              <a:buFont typeface="Arial"/>
-              <a:buChar char="•"/>
-              <a:defRPr sz="2000" kern="1200">
-                <a:solidFill>
-                  <a:schemeClr val="tx1"/>
-                </a:solidFill>
-                <a:latin typeface="+mn-lt"/>
-                <a:ea typeface="+mn-ea"/>
-                <a:cs typeface="+mn-cs"/>
-              </a:defRPr>
-            </a:lvl7pPr>
-            <a:lvl8pPr marL="3429000" indent="-228600" algn="l" defTabSz="457200" rtl="0" eaLnBrk="1" latinLnBrk="0" hangingPunct="1">
-              <a:spcBef>
-                <a:spcPct val="20000"/>
-              </a:spcBef>
-              <a:buFont typeface="Arial"/>
-              <a:buChar char="•"/>
-              <a:defRPr sz="2000" kern="1200">
-                <a:solidFill>
-                  <a:schemeClr val="tx1"/>
-                </a:solidFill>
-                <a:latin typeface="+mn-lt"/>
-                <a:ea typeface="+mn-ea"/>
-                <a:cs typeface="+mn-cs"/>
-              </a:defRPr>
-            </a:lvl8pPr>
-            <a:lvl9pPr marL="3886200" indent="-228600" algn="l" defTabSz="457200" rtl="0" eaLnBrk="1" latinLnBrk="0" hangingPunct="1">
-              <a:spcBef>
-                <a:spcPct val="20000"/>
-              </a:spcBef>
-              <a:buFont typeface="Arial"/>
-              <a:buChar char="•"/>
-              <a:defRPr sz="2000" kern="1200">
-                <a:solidFill>
-                  <a:schemeClr val="tx1"/>
-                </a:solidFill>
-                <a:latin typeface="+mn-lt"/>
-                <a:ea typeface="+mn-ea"/>
-                <a:cs typeface="+mn-cs"/>
-              </a:defRPr>
-            </a:lvl9pPr>
-          </a:lstStyle>
-          <a:p>
-            <a:r>
-              <a:rPr lang="en-US" sz="2000" u="sng" dirty="0"/>
-              <a:t>Master of Science</a:t>
-            </a:r>
-          </a:p>
-          <a:p>
-            <a:pPr lvl="1"/>
-            <a:r>
-              <a:rPr lang="en-US" sz="2000" dirty="0"/>
-              <a:t>Operations Management</a:t>
-            </a:r>
-          </a:p>
-          <a:p>
-            <a:pPr lvl="1"/>
-            <a:r>
-              <a:rPr lang="en-US" sz="2000" dirty="0"/>
-              <a:t>Engineering Management</a:t>
-            </a:r>
-          </a:p>
-          <a:p>
-            <a:pPr lvl="1"/>
-            <a:r>
-              <a:rPr lang="en-US" sz="2000" dirty="0"/>
-              <a:t>Engineering</a:t>
-            </a:r>
-          </a:p>
-          <a:p>
-            <a:r>
-              <a:rPr lang="en-US" sz="2000" u="sng" dirty="0"/>
-              <a:t>Graduate Certificates</a:t>
-            </a:r>
-          </a:p>
-          <a:p>
-            <a:pPr lvl="1"/>
-            <a:r>
-              <a:rPr lang="en-US" sz="2000" dirty="0"/>
-              <a:t>Project Management</a:t>
-            </a:r>
-          </a:p>
-          <a:p>
-            <a:pPr lvl="1"/>
-            <a:r>
-              <a:rPr lang="en-US" sz="2000" dirty="0"/>
-              <a:t>Lean Six Sigma</a:t>
-            </a:r>
-          </a:p>
-          <a:p>
-            <a:pPr lvl="1"/>
-            <a:r>
-              <a:rPr lang="en-US" sz="2000" dirty="0"/>
-              <a:t>Homeland Security</a:t>
-            </a:r>
-          </a:p>
-        </p:txBody>
-      </p:sp>
-      <p:pic>
-        <p:nvPicPr>
-          <p:cNvPr id="6" name="Picture 5">
-            <a:extLst>
-              <a:ext uri="{FF2B5EF4-FFF2-40B4-BE49-F238E27FC236}">
-                <a16:creationId xmlns:a16="http://schemas.microsoft.com/office/drawing/2014/main" id="{08F312E9-31C6-DE49-A5B8-2634C538B635}"/>
-              </a:ext>
-            </a:extLst>
-          </p:cNvPr>
-          <p:cNvPicPr>
-            <a:picLocks noChangeAspect="1"/>
-          </p:cNvPicPr>
-          <p:nvPr/>
-        </p:nvPicPr>
-        <p:blipFill>
-          <a:blip r:embed="rId2" cstate="email">
-            <a:extLst>
-              <a:ext uri="{28A0092B-C50C-407E-A947-70E740481C1C}">
-                <a14:useLocalDpi xmlns:a14="http://schemas.microsoft.com/office/drawing/2010/main" val="0"/>
-              </a:ext>
-            </a:extLst>
-          </a:blip>
-          <a:stretch>
-            <a:fillRect/>
-          </a:stretch>
-        </p:blipFill>
-        <p:spPr>
-          <a:xfrm>
-            <a:off x="5957860" y="2084722"/>
-            <a:ext cx="2089457" cy="2785942"/>
-          </a:xfrm>
-          <a:prstGeom prst="rect">
-            <a:avLst/>
-          </a:prstGeom>
-          <a:ln w="38100" cap="sq">
-            <a:solidFill>
-              <a:srgbClr val="000000"/>
-            </a:solidFill>
-            <a:prstDash val="solid"/>
-            <a:miter lim="800000"/>
-          </a:ln>
-          <a:effectLst>
-            <a:outerShdw blurRad="50800" dist="38100" dir="2700000" algn="tl" rotWithShape="0">
-              <a:srgbClr val="000000">
-                <a:alpha val="43000"/>
-              </a:srgbClr>
-            </a:outerShdw>
-          </a:effectLst>
-        </p:spPr>
-      </p:pic>
-    </p:spTree>
-    <p:extLst>
-      <p:ext uri="{BB962C8B-B14F-4D97-AF65-F5344CB8AC3E}">
-        <p14:creationId xmlns:p14="http://schemas.microsoft.com/office/powerpoint/2010/main" val="3577534171"/>
-      </p:ext>
-    </p:extLst>
-  </p:cSld>
-  <p:clrMapOvr>
-    <a:masterClrMapping/>
-  </p:clrMapOvr>
-</p:sld>
-</file>
-
-<file path=ppt/slides/slide4.xml><?xml version="1.0" encoding="utf-8"?>
 <p:sld xmlns:a="http://schemas.openxmlformats.org/drawingml/2006/main" xmlns:r="http://schemas.openxmlformats.org/officeDocument/2006/relationships" xmlns:p="http://schemas.openxmlformats.org/presentationml/2006/main">
   <p:cSld>
     <p:spTree>
@@ -6198,7 +3900,7 @@
 </p:sld>
 </file>
 
-<file path=ppt/slides/slide5.xml><?xml version="1.0" encoding="utf-8"?>
+<file path=ppt/slides/slide4.xml><?xml version="1.0" encoding="utf-8"?>
 <p:sld xmlns:a="http://schemas.openxmlformats.org/drawingml/2006/main" xmlns:r="http://schemas.openxmlformats.org/officeDocument/2006/relationships" xmlns:p="http://schemas.openxmlformats.org/presentationml/2006/main">
   <p:cSld>
     <p:spTree>
@@ -6453,7 +4155,7 @@
 </p:sld>
 </file>
 
-<file path=ppt/slides/slide6.xml><?xml version="1.0" encoding="utf-8"?>
+<file path=ppt/slides/slide5.xml><?xml version="1.0" encoding="utf-8"?>
 <p:sld xmlns:a="http://schemas.openxmlformats.org/drawingml/2006/main" xmlns:r="http://schemas.openxmlformats.org/officeDocument/2006/relationships" xmlns:p="http://schemas.openxmlformats.org/presentationml/2006/main">
   <p:cSld>
     <p:spTree>
@@ -6541,7 +4243,7 @@
 </p:sld>
 </file>
 
-<file path=ppt/slides/slide7.xml><?xml version="1.0" encoding="utf-8"?>
+<file path=ppt/slides/slide6.xml><?xml version="1.0" encoding="utf-8"?>
 <p:sld xmlns:a="http://schemas.openxmlformats.org/drawingml/2006/main" xmlns:r="http://schemas.openxmlformats.org/officeDocument/2006/relationships" xmlns:p="http://schemas.openxmlformats.org/presentationml/2006/main">
   <p:cSld>
     <p:spTree>
@@ -6672,7 +4374,7 @@
 </p:sld>
 </file>
 
-<file path=ppt/slides/slide8.xml><?xml version="1.0" encoding="utf-8"?>
+<file path=ppt/slides/slide7.xml><?xml version="1.0" encoding="utf-8"?>
 <p:sld xmlns:a="http://schemas.openxmlformats.org/drawingml/2006/main" xmlns:r="http://schemas.openxmlformats.org/officeDocument/2006/relationships" xmlns:p="http://schemas.openxmlformats.org/presentationml/2006/main">
   <p:cSld>
     <p:spTree>
@@ -6839,6 +4541,267 @@
 </p:sld>
 </file>
 
+<file path=ppt/slides/slide8.xml><?xml version="1.0" encoding="utf-8"?>
+<p:sld xmlns:a="http://schemas.openxmlformats.org/drawingml/2006/main" xmlns:r="http://schemas.openxmlformats.org/officeDocument/2006/relationships" xmlns:p="http://schemas.openxmlformats.org/presentationml/2006/main">
+  <p:cSld>
+    <p:spTree>
+      <p:nvGrpSpPr>
+        <p:cNvPr id="1" name=""/>
+        <p:cNvGrpSpPr/>
+        <p:nvPr/>
+      </p:nvGrpSpPr>
+      <p:grpSpPr>
+        <a:xfrm>
+          <a:off x="0" y="0"/>
+          <a:ext cx="0" cy="0"/>
+          <a:chOff x="0" y="0"/>
+          <a:chExt cx="0" cy="0"/>
+        </a:xfrm>
+      </p:grpSpPr>
+      <p:sp>
+        <p:nvSpPr>
+          <p:cNvPr id="2" name="Title 1">
+            <a:extLst>
+              <a:ext uri="{FF2B5EF4-FFF2-40B4-BE49-F238E27FC236}">
+                <a16:creationId xmlns:a16="http://schemas.microsoft.com/office/drawing/2014/main" id="{F5823C2B-9A08-4EC1-97BE-BA2E45E746B3}"/>
+              </a:ext>
+            </a:extLst>
+          </p:cNvPr>
+          <p:cNvSpPr>
+            <a:spLocks noGrp="1"/>
+          </p:cNvSpPr>
+          <p:nvPr>
+            <p:ph type="title"/>
+          </p:nvPr>
+        </p:nvSpPr>
+        <p:spPr/>
+        <p:txBody>
+          <a:bodyPr/>
+          <a:lstStyle/>
+          <a:p>
+            <a:r>
+              <a:rPr lang="en-US" dirty="0"/>
+              <a:t>Data</a:t>
+            </a:r>
+          </a:p>
+        </p:txBody>
+      </p:sp>
+      <p:sp>
+        <p:nvSpPr>
+          <p:cNvPr id="6" name="TextBox 5">
+            <a:extLst>
+              <a:ext uri="{FF2B5EF4-FFF2-40B4-BE49-F238E27FC236}">
+                <a16:creationId xmlns:a16="http://schemas.microsoft.com/office/drawing/2014/main" id="{87A04496-74C3-43F5-A5C7-3B578495B9A5}"/>
+              </a:ext>
+            </a:extLst>
+          </p:cNvPr>
+          <p:cNvSpPr txBox="1"/>
+          <p:nvPr/>
+        </p:nvSpPr>
+        <p:spPr>
+          <a:xfrm>
+            <a:off x="805343" y="1245598"/>
+            <a:ext cx="7533314" cy="5816977"/>
+          </a:xfrm>
+          <a:prstGeom prst="rect">
+            <a:avLst/>
+          </a:prstGeom>
+          <a:noFill/>
+        </p:spPr>
+        <p:txBody>
+          <a:bodyPr wrap="square" rtlCol="0">
+            <a:spAutoFit/>
+          </a:bodyPr>
+          <a:lstStyle/>
+          <a:p>
+            <a:pPr marL="285750" indent="-285750">
+              <a:buFont typeface="Arial" panose="020B0604020202020204" pitchFamily="34" charset="0"/>
+              <a:buChar char="•"/>
+            </a:pPr>
+            <a:r>
+              <a:rPr lang="en-US" sz="2400" dirty="0"/>
+              <a:t>ESPN Analytics Ranking (1-5)</a:t>
+            </a:r>
+          </a:p>
+          <a:p>
+            <a:pPr marL="742950" lvl="1" indent="-285750">
+              <a:buFont typeface="Arial" panose="020B0604020202020204" pitchFamily="34" charset="0"/>
+              <a:buChar char="•"/>
+            </a:pPr>
+            <a:r>
+              <a:rPr lang="en-US" dirty="0"/>
+              <a:t>5 – All-in</a:t>
+            </a:r>
+          </a:p>
+          <a:p>
+            <a:pPr marL="742950" lvl="1" indent="-285750">
+              <a:buFont typeface="Arial" panose="020B0604020202020204" pitchFamily="34" charset="0"/>
+              <a:buChar char="•"/>
+            </a:pPr>
+            <a:r>
+              <a:rPr lang="en-US" dirty="0"/>
+              <a:t>4 – Believers</a:t>
+            </a:r>
+          </a:p>
+          <a:p>
+            <a:pPr marL="742950" lvl="1" indent="-285750">
+              <a:buFont typeface="Arial" panose="020B0604020202020204" pitchFamily="34" charset="0"/>
+              <a:buChar char="•"/>
+            </a:pPr>
+            <a:r>
+              <a:rPr lang="en-US" dirty="0"/>
+              <a:t>3 – One foot in</a:t>
+            </a:r>
+          </a:p>
+          <a:p>
+            <a:pPr marL="742950" lvl="1" indent="-285750">
+              <a:buFont typeface="Arial" panose="020B0604020202020204" pitchFamily="34" charset="0"/>
+              <a:buChar char="•"/>
+            </a:pPr>
+            <a:r>
+              <a:rPr lang="en-US" dirty="0"/>
+              <a:t>2 – Skeptics</a:t>
+            </a:r>
+          </a:p>
+          <a:p>
+            <a:pPr marL="742950" lvl="1" indent="-285750">
+              <a:buFont typeface="Arial" panose="020B0604020202020204" pitchFamily="34" charset="0"/>
+              <a:buChar char="•"/>
+            </a:pPr>
+            <a:r>
+              <a:rPr lang="en-US" dirty="0"/>
+              <a:t>1 - Nonbelievers</a:t>
+            </a:r>
+          </a:p>
+          <a:p>
+            <a:pPr marL="285750" indent="-285750">
+              <a:buFont typeface="Arial" panose="020B0604020202020204" pitchFamily="34" charset="0"/>
+              <a:buChar char="•"/>
+            </a:pPr>
+            <a:r>
+              <a:rPr lang="en-US" sz="2400" dirty="0"/>
+              <a:t>How far did the team go in the playoffs? (1-5)</a:t>
+            </a:r>
+          </a:p>
+          <a:p>
+            <a:pPr marL="742950" lvl="1" indent="-285750">
+              <a:buFont typeface="Arial" panose="020B0604020202020204" pitchFamily="34" charset="0"/>
+              <a:buChar char="•"/>
+            </a:pPr>
+            <a:r>
+              <a:rPr lang="en-US" dirty="0"/>
+              <a:t>5 – Champion</a:t>
+            </a:r>
+          </a:p>
+          <a:p>
+            <a:pPr marL="742950" lvl="1" indent="-285750">
+              <a:buFont typeface="Arial" panose="020B0604020202020204" pitchFamily="34" charset="0"/>
+              <a:buChar char="•"/>
+            </a:pPr>
+            <a:r>
+              <a:rPr lang="en-US" dirty="0"/>
+              <a:t>4 – Runner up</a:t>
+            </a:r>
+          </a:p>
+          <a:p>
+            <a:pPr marL="742950" lvl="1" indent="-285750">
+              <a:buFont typeface="Arial" panose="020B0604020202020204" pitchFamily="34" charset="0"/>
+              <a:buChar char="•"/>
+            </a:pPr>
+            <a:r>
+              <a:rPr lang="en-US" dirty="0"/>
+              <a:t>3 – Loss in third round</a:t>
+            </a:r>
+          </a:p>
+          <a:p>
+            <a:pPr marL="742950" lvl="1" indent="-285750">
+              <a:buFont typeface="Arial" panose="020B0604020202020204" pitchFamily="34" charset="0"/>
+              <a:buChar char="•"/>
+            </a:pPr>
+            <a:r>
+              <a:rPr lang="en-US" dirty="0"/>
+              <a:t>2 – Loss in second round</a:t>
+            </a:r>
+          </a:p>
+          <a:p>
+            <a:pPr marL="742950" lvl="1" indent="-285750">
+              <a:buFont typeface="Arial" panose="020B0604020202020204" pitchFamily="34" charset="0"/>
+              <a:buChar char="•"/>
+            </a:pPr>
+            <a:r>
+              <a:rPr lang="en-US" dirty="0"/>
+              <a:t>1 – Loss in first round</a:t>
+            </a:r>
+          </a:p>
+          <a:p>
+            <a:pPr marL="285750" indent="-285750">
+              <a:buFont typeface="Arial" panose="020B0604020202020204" pitchFamily="34" charset="0"/>
+              <a:buChar char="•"/>
+            </a:pPr>
+            <a:r>
+              <a:rPr lang="en-US" sz="2400" dirty="0"/>
+              <a:t>City size </a:t>
+            </a:r>
+          </a:p>
+          <a:p>
+            <a:pPr marL="742950" lvl="1" indent="-285750">
+              <a:buFont typeface="Arial" panose="020B0604020202020204" pitchFamily="34" charset="0"/>
+              <a:buChar char="•"/>
+            </a:pPr>
+            <a:r>
+              <a:rPr lang="en-US" sz="2400" dirty="0"/>
+              <a:t>2010 US Census</a:t>
+            </a:r>
+          </a:p>
+          <a:p>
+            <a:pPr marL="742950" lvl="1" indent="-285750">
+              <a:buFont typeface="Arial" panose="020B0604020202020204" pitchFamily="34" charset="0"/>
+              <a:buChar char="•"/>
+            </a:pPr>
+            <a:r>
+              <a:rPr lang="en-US" sz="2400" dirty="0"/>
+              <a:t>Canadian Cities Wikipedia</a:t>
+            </a:r>
+          </a:p>
+          <a:p>
+            <a:pPr marL="285750" indent="-285750">
+              <a:buFont typeface="Arial" panose="020B0604020202020204" pitchFamily="34" charset="0"/>
+              <a:buChar char="•"/>
+            </a:pPr>
+            <a:r>
+              <a:rPr lang="en-US" sz="2400" dirty="0"/>
+              <a:t>Salary – spotrac.com</a:t>
+            </a:r>
+          </a:p>
+          <a:p>
+            <a:pPr marL="742950" lvl="1" indent="-285750">
+              <a:buFont typeface="Arial" panose="020B0604020202020204" pitchFamily="34" charset="0"/>
+              <a:buChar char="•"/>
+            </a:pPr>
+            <a:endParaRPr lang="en-US" sz="2400" dirty="0"/>
+          </a:p>
+          <a:p>
+            <a:pPr marL="285750" indent="-285750">
+              <a:buFont typeface="Arial" panose="020B0604020202020204" pitchFamily="34" charset="0"/>
+              <a:buChar char="•"/>
+            </a:pPr>
+            <a:endParaRPr lang="en-US" sz="2400" dirty="0"/>
+          </a:p>
+        </p:txBody>
+      </p:sp>
+    </p:spTree>
+    <p:extLst>
+      <p:ext uri="{BB962C8B-B14F-4D97-AF65-F5344CB8AC3E}">
+        <p14:creationId xmlns:p14="http://schemas.microsoft.com/office/powerpoint/2010/main" val="2768989242"/>
+      </p:ext>
+    </p:extLst>
+  </p:cSld>
+  <p:clrMapOvr>
+    <a:masterClrMapping/>
+  </p:clrMapOvr>
+</p:sld>
+</file>
+
 <file path=ppt/slides/slide9.xml><?xml version="1.0" encoding="utf-8"?>
 <p:sld xmlns:a="http://schemas.openxmlformats.org/drawingml/2006/main" xmlns:r="http://schemas.openxmlformats.org/officeDocument/2006/relationships" xmlns:p="http://schemas.openxmlformats.org/presentationml/2006/main">
   <p:cSld>
@@ -6861,7 +4824,7 @@
           <p:cNvPr id="2" name="Title 1">
             <a:extLst>
               <a:ext uri="{FF2B5EF4-FFF2-40B4-BE49-F238E27FC236}">
-                <a16:creationId xmlns:a16="http://schemas.microsoft.com/office/drawing/2014/main" id="{F5823C2B-9A08-4EC1-97BE-BA2E45E746B3}"/>
+                <a16:creationId xmlns:a16="http://schemas.microsoft.com/office/drawing/2014/main" id="{8FFB8084-FC73-46B2-B7FF-F38FA796504D}"/>
               </a:ext>
             </a:extLst>
           </p:cNvPr>
@@ -6879,17 +4842,17 @@
           <a:p>
             <a:r>
               <a:rPr lang="en-US" dirty="0"/>
-              <a:t>Data</a:t>
-            </a:r>
-          </a:p>
-        </p:txBody>
-      </p:sp>
-      <p:sp>
-        <p:nvSpPr>
-          <p:cNvPr id="6" name="TextBox 5">
+              <a:t>Challenges</a:t>
+            </a:r>
+          </a:p>
+        </p:txBody>
+      </p:sp>
+      <p:sp>
+        <p:nvSpPr>
+          <p:cNvPr id="4" name="TextBox 3">
             <a:extLst>
               <a:ext uri="{FF2B5EF4-FFF2-40B4-BE49-F238E27FC236}">
-                <a16:creationId xmlns:a16="http://schemas.microsoft.com/office/drawing/2014/main" id="{87A04496-74C3-43F5-A5C7-3B578495B9A5}"/>
+                <a16:creationId xmlns:a16="http://schemas.microsoft.com/office/drawing/2014/main" id="{05BE09D0-FA7C-4C1E-A624-E785F3E7D6D9}"/>
               </a:ext>
             </a:extLst>
           </p:cNvPr>
@@ -6898,8 +4861,8 @@
         </p:nvSpPr>
         <p:spPr>
           <a:xfrm>
-            <a:off x="805343" y="1245598"/>
-            <a:ext cx="7533314" cy="5816977"/>
+            <a:off x="883930" y="1169408"/>
+            <a:ext cx="7533314" cy="6001643"/>
           </a:xfrm>
           <a:prstGeom prst="rect">
             <a:avLst/>
@@ -6918,7 +4881,17 @@
             </a:pPr>
             <a:r>
               <a:rPr lang="en-US" sz="2400" dirty="0"/>
-              <a:t>ESPN Analytics Ranking (1-5)</a:t>
+              <a:t>Team analytics have changed. 2015 ESPN ranking only performed once.</a:t>
+            </a:r>
+          </a:p>
+          <a:p>
+            <a:pPr marL="285750" indent="-285750">
+              <a:buFont typeface="Arial" panose="020B0604020202020204" pitchFamily="34" charset="0"/>
+              <a:buChar char="•"/>
+            </a:pPr>
+            <a:r>
+              <a:rPr lang="en-US" sz="2400" dirty="0"/>
+              <a:t>Salary data issues</a:t>
             </a:r>
           </a:p>
           <a:p>
@@ -6927,8 +4900,8 @@
               <a:buChar char="•"/>
             </a:pPr>
             <a:r>
-              <a:rPr lang="en-US" dirty="0"/>
-              <a:t>5 – All-in</a:t>
+              <a:rPr lang="en-US" sz="2400" dirty="0"/>
+              <a:t>Use available cap space for NHL, NFL, NBA</a:t>
             </a:r>
           </a:p>
           <a:p>
@@ -6937,8 +4910,18 @@
               <a:buChar char="•"/>
             </a:pPr>
             <a:r>
-              <a:rPr lang="en-US" dirty="0"/>
-              <a:t>4 – Believers</a:t>
+              <a:rPr lang="en-US" sz="2400" dirty="0"/>
+              <a:t>Use total team salary for MLB</a:t>
+            </a:r>
+          </a:p>
+          <a:p>
+            <a:pPr marL="285750" indent="-285750">
+              <a:buFont typeface="Arial" panose="020B0604020202020204" pitchFamily="34" charset="0"/>
+              <a:buChar char="•"/>
+            </a:pPr>
+            <a:r>
+              <a:rPr lang="en-US" sz="2400" dirty="0"/>
+              <a:t>Expansion</a:t>
             </a:r>
           </a:p>
           <a:p>
@@ -6947,8 +4930,18 @@
               <a:buChar char="•"/>
             </a:pPr>
             <a:r>
-              <a:rPr lang="en-US" dirty="0"/>
-              <a:t>3 – One foot in</a:t>
+              <a:rPr lang="en-US" sz="2400" dirty="0"/>
+              <a:t>Las Vegas Golden Knights</a:t>
+            </a:r>
+          </a:p>
+          <a:p>
+            <a:pPr marL="285750" indent="-285750">
+              <a:buFont typeface="Arial" panose="020B0604020202020204" pitchFamily="34" charset="0"/>
+              <a:buChar char="•"/>
+            </a:pPr>
+            <a:r>
+              <a:rPr lang="en-US" sz="2400" dirty="0"/>
+              <a:t>Moving</a:t>
             </a:r>
           </a:p>
           <a:p>
@@ -6957,8 +4950,8 @@
               <a:buChar char="•"/>
             </a:pPr>
             <a:r>
-              <a:rPr lang="en-US" dirty="0"/>
-              <a:t>2 – Skeptics</a:t>
+              <a:rPr lang="en-US" sz="2400" dirty="0"/>
+              <a:t>2016 Rams - St. Louis to Los Angeles</a:t>
             </a:r>
           </a:p>
           <a:p>
@@ -6967,8 +4960,18 @@
               <a:buChar char="•"/>
             </a:pPr>
             <a:r>
-              <a:rPr lang="en-US" dirty="0"/>
-              <a:t>1 - Nonbelievers</a:t>
+              <a:rPr lang="en-US" sz="2400" dirty="0"/>
+              <a:t>2017 Chargers - San Diego to Los Angeles</a:t>
+            </a:r>
+          </a:p>
+          <a:p>
+            <a:pPr marL="742950" lvl="1" indent="-285750">
+              <a:buFont typeface="Arial" panose="020B0604020202020204" pitchFamily="34" charset="0"/>
+              <a:buChar char="•"/>
+            </a:pPr>
+            <a:r>
+              <a:rPr lang="en-US" sz="2400" dirty="0"/>
+              <a:t>2020 Raiders - Oakland to Las Vegas</a:t>
             </a:r>
           </a:p>
           <a:p>
@@ -6978,7 +4981,7 @@
             </a:pPr>
             <a:r>
               <a:rPr lang="en-US" sz="2400" dirty="0"/>
-              <a:t>How far did the team go in the playoffs? (1-5)</a:t>
+              <a:t>Name Change</a:t>
             </a:r>
           </a:p>
           <a:p>
@@ -6987,48 +4990,8 @@
               <a:buChar char="•"/>
             </a:pPr>
             <a:r>
-              <a:rPr lang="en-US" dirty="0"/>
-              <a:t>5 – Champion</a:t>
-            </a:r>
-          </a:p>
-          <a:p>
-            <a:pPr marL="742950" lvl="1" indent="-285750">
-              <a:buFont typeface="Arial" panose="020B0604020202020204" pitchFamily="34" charset="0"/>
-              <a:buChar char="•"/>
-            </a:pPr>
-            <a:r>
-              <a:rPr lang="en-US" dirty="0"/>
-              <a:t>4 – Runner up</a:t>
-            </a:r>
-          </a:p>
-          <a:p>
-            <a:pPr marL="742950" lvl="1" indent="-285750">
-              <a:buFont typeface="Arial" panose="020B0604020202020204" pitchFamily="34" charset="0"/>
-              <a:buChar char="•"/>
-            </a:pPr>
-            <a:r>
-              <a:rPr lang="en-US" dirty="0"/>
-              <a:t>3 – Loss in third round</a:t>
-            </a:r>
-          </a:p>
-          <a:p>
-            <a:pPr marL="742950" lvl="1" indent="-285750">
-              <a:buFont typeface="Arial" panose="020B0604020202020204" pitchFamily="34" charset="0"/>
-              <a:buChar char="•"/>
-            </a:pPr>
-            <a:r>
-              <a:rPr lang="en-US" dirty="0"/>
-              <a:t>2 – Loss in second round</a:t>
-            </a:r>
-          </a:p>
-          <a:p>
-            <a:pPr marL="742950" lvl="1" indent="-285750">
-              <a:buFont typeface="Arial" panose="020B0604020202020204" pitchFamily="34" charset="0"/>
-              <a:buChar char="•"/>
-            </a:pPr>
-            <a:r>
-              <a:rPr lang="en-US" dirty="0"/>
-              <a:t>1 – Loss in first round</a:t>
+              <a:rPr lang="en-US" sz="2400" dirty="0"/>
+              <a:t>Washington Football Team</a:t>
             </a:r>
           </a:p>
           <a:p>
@@ -7038,37 +5001,7 @@
             </a:pPr>
             <a:r>
               <a:rPr lang="en-US" sz="2400" dirty="0"/>
-              <a:t>City size </a:t>
-            </a:r>
-          </a:p>
-          <a:p>
-            <a:pPr marL="742950" lvl="1" indent="-285750">
-              <a:buFont typeface="Arial" panose="020B0604020202020204" pitchFamily="34" charset="0"/>
-              <a:buChar char="•"/>
-            </a:pPr>
-            <a:r>
-              <a:rPr lang="en-US" sz="2400" dirty="0"/>
-              <a:t>2010 US Census</a:t>
-            </a:r>
-          </a:p>
-          <a:p>
-            <a:pPr marL="742950" lvl="1" indent="-285750">
-              <a:buFont typeface="Arial" panose="020B0604020202020204" pitchFamily="34" charset="0"/>
-              <a:buChar char="•"/>
-            </a:pPr>
-            <a:r>
-              <a:rPr lang="en-US" sz="2400" dirty="0"/>
-              <a:t>Canadian Cities Wikipedia</a:t>
-            </a:r>
-          </a:p>
-          <a:p>
-            <a:pPr marL="285750" indent="-285750">
-              <a:buFont typeface="Arial" panose="020B0604020202020204" pitchFamily="34" charset="0"/>
-              <a:buChar char="•"/>
-            </a:pPr>
-            <a:r>
-              <a:rPr lang="en-US" sz="2400" dirty="0"/>
-              <a:t>Salary – spotrac.com</a:t>
+              <a:t>2020 US Census</a:t>
             </a:r>
           </a:p>
           <a:p>
@@ -7090,7 +5023,7 @@
     </p:spTree>
     <p:extLst>
       <p:ext uri="{BB962C8B-B14F-4D97-AF65-F5344CB8AC3E}">
-        <p14:creationId xmlns:p14="http://schemas.microsoft.com/office/powerpoint/2010/main" val="2768989242"/>
+        <p14:creationId xmlns:p14="http://schemas.microsoft.com/office/powerpoint/2010/main" val="3725537746"/>
       </p:ext>
     </p:extLst>
   </p:cSld>
@@ -7098,6 +5031,17 @@
     <a:masterClrMapping/>
   </p:clrMapOvr>
 </p:sld>
+</file>
+
+<file path=ppt/tags/tag1.xml><?xml version="1.0" encoding="utf-8"?>
+<p:tagLst xmlns:a="http://schemas.openxmlformats.org/drawingml/2006/main" xmlns:r="http://schemas.openxmlformats.org/officeDocument/2006/relationships" xmlns:p="http://schemas.openxmlformats.org/presentationml/2006/main">
+  <p:tag name="TPPRESENTATIONGUID" val="2cd14b34-c360-4578-86a8-b1a995dab68d"/>
+  <p:tag name="TPVERSION" val="8"/>
+  <p:tag name="TPFULLVERSION" val="8.9.4.26"/>
+  <p:tag name="PPTVERSION" val="16"/>
+  <p:tag name="TPOS" val="2"/>
+  <p:tag name="TPLASTSAVEVERSION" val="6.4 PC"/>
+</p:tagLst>
 </file>
 
 <file path=ppt/theme/theme1.xml><?xml version="1.0" encoding="utf-8"?>

</xml_diff>